<commit_message>
Final materials for tomorrow.
</commit_message>
<xml_diff>
--- a/presentation/pptx/05-Unsupervised Learning - Clustering.pptx
+++ b/presentation/pptx/05-Unsupervised Learning - Clustering.pptx
@@ -5,7 +5,7 @@
     <p:sldMasterId id="2147483840" r:id="rId1"/>
   </p:sldMasterIdLst>
   <p:notesMasterIdLst>
-    <p:notesMasterId r:id="rId33"/>
+    <p:notesMasterId r:id="rId38"/>
   </p:notesMasterIdLst>
   <p:sldIdLst>
     <p:sldId id="256" r:id="rId2"/>
@@ -39,6 +39,11 @@
     <p:sldId id="327" r:id="rId30"/>
     <p:sldId id="267" r:id="rId31"/>
     <p:sldId id="325" r:id="rId32"/>
+    <p:sldId id="330" r:id="rId33"/>
+    <p:sldId id="331" r:id="rId34"/>
+    <p:sldId id="332" r:id="rId35"/>
+    <p:sldId id="334" r:id="rId36"/>
+    <p:sldId id="333" r:id="rId37"/>
   </p:sldIdLst>
   <p:sldSz cx="12192000" cy="6858000"/>
   <p:notesSz cx="6858000" cy="9144000"/>
@@ -161,6 +166,32 @@
 </p:presentation>
 </file>
 
+<file path=ppt/commentAuthors.xml><?xml version="1.0" encoding="utf-8"?>
+<p:cmAuthorLst xmlns:a="http://schemas.openxmlformats.org/drawingml/2006/main" xmlns:r="http://schemas.openxmlformats.org/officeDocument/2006/relationships" xmlns:p="http://schemas.openxmlformats.org/presentationml/2006/main">
+  <p:cmAuthor id="1" name="Adi Sarid" initials="AS" lastIdx="1" clrIdx="0">
+    <p:extLst>
+      <p:ext uri="{19B8F6BF-5375-455C-9EA6-DF929625EA0E}">
+        <p15:presenceInfo xmlns:p15="http://schemas.microsoft.com/office/powerpoint/2012/main" userId="936649b24e43f7cd" providerId="Windows Live"/>
+      </p:ext>
+    </p:extLst>
+  </p:cmAuthor>
+</p:cmAuthorLst>
+</file>
+
+<file path=ppt/comments/comment1.xml><?xml version="1.0" encoding="utf-8"?>
+<p:cmLst xmlns:a="http://schemas.openxmlformats.org/drawingml/2006/main" xmlns:r="http://schemas.openxmlformats.org/officeDocument/2006/relationships" xmlns:p="http://schemas.openxmlformats.org/presentationml/2006/main">
+  <p:cm authorId="1" dt="2019-09-12T00:14:17.828" idx="1">
+    <p:pos x="10" y="10"/>
+    <p:text/>
+    <p:extLst>
+      <p:ext uri="{C676402C-5697-4E1C-873F-D02D1690AC5C}">
+        <p15:threadingInfo xmlns:p15="http://schemas.microsoft.com/office/powerpoint/2012/main" timeZoneBias="-180"/>
+      </p:ext>
+    </p:extLst>
+  </p:cm>
+</p:cmLst>
+</file>
+
 <file path=ppt/notesMasters/notesMaster1.xml><?xml version="1.0" encoding="utf-8"?>
 <p:notesMaster xmlns:a="http://schemas.openxmlformats.org/drawingml/2006/main" xmlns:r="http://schemas.openxmlformats.org/officeDocument/2006/relationships" xmlns:p="http://schemas.openxmlformats.org/presentationml/2006/main">
   <p:cSld>
@@ -1275,6 +1306,363 @@
     <p:extLst>
       <p:ext uri="{BB962C8B-B14F-4D97-AF65-F5344CB8AC3E}">
         <p14:creationId xmlns:p14="http://schemas.microsoft.com/office/powerpoint/2010/main" val="2057603373"/>
+      </p:ext>
+    </p:extLst>
+  </p:cSld>
+  <p:clrMapOvr>
+    <a:masterClrMapping/>
+  </p:clrMapOvr>
+</p:notes>
+</file>
+
+<file path=ppt/notesSlides/notesSlide8.xml><?xml version="1.0" encoding="utf-8"?>
+<p:notes xmlns:a="http://schemas.openxmlformats.org/drawingml/2006/main" xmlns:r="http://schemas.openxmlformats.org/officeDocument/2006/relationships" xmlns:p="http://schemas.openxmlformats.org/presentationml/2006/main">
+  <p:cSld>
+    <p:spTree>
+      <p:nvGrpSpPr>
+        <p:cNvPr id="1" name=""/>
+        <p:cNvGrpSpPr/>
+        <p:nvPr/>
+      </p:nvGrpSpPr>
+      <p:grpSpPr>
+        <a:xfrm>
+          <a:off x="0" y="0"/>
+          <a:ext cx="0" cy="0"/>
+          <a:chOff x="0" y="0"/>
+          <a:chExt cx="0" cy="0"/>
+        </a:xfrm>
+      </p:grpSpPr>
+      <p:sp>
+        <p:nvSpPr>
+          <p:cNvPr id="2" name="Slide Image Placeholder 1"/>
+          <p:cNvSpPr>
+            <a:spLocks noGrp="1" noRot="1" noChangeAspect="1"/>
+          </p:cNvSpPr>
+          <p:nvPr>
+            <p:ph type="sldImg"/>
+          </p:nvPr>
+        </p:nvSpPr>
+        <p:spPr/>
+      </p:sp>
+      <p:sp>
+        <p:nvSpPr>
+          <p:cNvPr id="3" name="Notes Placeholder 2"/>
+          <p:cNvSpPr>
+            <a:spLocks noGrp="1"/>
+          </p:cNvSpPr>
+          <p:nvPr>
+            <p:ph type="body" idx="1"/>
+          </p:nvPr>
+        </p:nvSpPr>
+        <p:spPr/>
+        <p:txBody>
+          <a:bodyPr/>
+          <a:lstStyle/>
+          <a:p>
+            <a:r>
+              <a:rPr lang="en-US" dirty="0"/>
+              <a:t>This Wikipedia value offers some more sources about the method and generalizations: </a:t>
+            </a:r>
+            <a:r>
+              <a:rPr lang="en-US" dirty="0">
+                <a:hlinkClick r:id="rId3"/>
+              </a:rPr>
+              <a:t>https://en.wikipedia.org/wiki/Local_outlier_factor</a:t>
+            </a:r>
+            <a:endParaRPr lang="en-IL" dirty="0"/>
+          </a:p>
+        </p:txBody>
+      </p:sp>
+      <p:sp>
+        <p:nvSpPr>
+          <p:cNvPr id="4" name="Slide Number Placeholder 3"/>
+          <p:cNvSpPr>
+            <a:spLocks noGrp="1"/>
+          </p:cNvSpPr>
+          <p:nvPr>
+            <p:ph type="sldNum" sz="quarter" idx="5"/>
+          </p:nvPr>
+        </p:nvSpPr>
+        <p:spPr/>
+        <p:txBody>
+          <a:bodyPr/>
+          <a:lstStyle/>
+          <a:p>
+            <a:fld id="{C4276747-8356-4D8F-84BF-3C530C5DAF39}" type="slidenum">
+              <a:rPr lang="he-IL" smtClean="0"/>
+              <a:t>34</a:t>
+            </a:fld>
+            <a:endParaRPr lang="he-IL"/>
+          </a:p>
+        </p:txBody>
+      </p:sp>
+    </p:spTree>
+    <p:extLst>
+      <p:ext uri="{BB962C8B-B14F-4D97-AF65-F5344CB8AC3E}">
+        <p14:creationId xmlns:p14="http://schemas.microsoft.com/office/powerpoint/2010/main" val="2390335659"/>
+      </p:ext>
+    </p:extLst>
+  </p:cSld>
+  <p:clrMapOvr>
+    <a:masterClrMapping/>
+  </p:clrMapOvr>
+</p:notes>
+</file>
+
+<file path=ppt/notesSlides/notesSlide9.xml><?xml version="1.0" encoding="utf-8"?>
+<p:notes xmlns:a="http://schemas.openxmlformats.org/drawingml/2006/main" xmlns:r="http://schemas.openxmlformats.org/officeDocument/2006/relationships" xmlns:p="http://schemas.openxmlformats.org/presentationml/2006/main">
+  <p:cSld>
+    <p:spTree>
+      <p:nvGrpSpPr>
+        <p:cNvPr id="1" name=""/>
+        <p:cNvGrpSpPr/>
+        <p:nvPr/>
+      </p:nvGrpSpPr>
+      <p:grpSpPr>
+        <a:xfrm>
+          <a:off x="0" y="0"/>
+          <a:ext cx="0" cy="0"/>
+          <a:chOff x="0" y="0"/>
+          <a:chExt cx="0" cy="0"/>
+        </a:xfrm>
+      </p:grpSpPr>
+      <p:sp>
+        <p:nvSpPr>
+          <p:cNvPr id="2" name="Slide Image Placeholder 1"/>
+          <p:cNvSpPr>
+            <a:spLocks noGrp="1" noRot="1" noChangeAspect="1"/>
+          </p:cNvSpPr>
+          <p:nvPr>
+            <p:ph type="sldImg"/>
+          </p:nvPr>
+        </p:nvSpPr>
+        <p:spPr/>
+      </p:sp>
+      <mc:AlternateContent xmlns:mc="http://schemas.openxmlformats.org/markup-compatibility/2006">
+        <mc:Choice xmlns:a14="http://schemas.microsoft.com/office/drawing/2010/main" Requires="a14">
+          <p:sp>
+            <p:nvSpPr>
+              <p:cNvPr id="3" name="Notes Placeholder 2"/>
+              <p:cNvSpPr>
+                <a:spLocks noGrp="1"/>
+              </p:cNvSpPr>
+              <p:nvPr>
+                <p:ph type="body" idx="1"/>
+              </p:nvPr>
+            </p:nvSpPr>
+            <p:spPr/>
+            <p:txBody>
+              <a:bodyPr/>
+              <a:lstStyle/>
+              <a:p>
+                <a:r>
+                  <a:rPr lang="en-US" dirty="0"/>
+                  <a:t>Isolation-Based Anomaly Detection: </a:t>
+                </a:r>
+                <a:r>
+                  <a:rPr lang="en-US" dirty="0">
+                    <a:hlinkClick r:id="rId3"/>
+                  </a:rPr>
+                  <a:t>https://dl.acm.org/citation.cfm?id=2133363</a:t>
+                </a:r>
+                <a:endParaRPr lang="en-US" dirty="0"/>
+              </a:p>
+              <a:p>
+                <a:endParaRPr lang="en-US" dirty="0"/>
+              </a:p>
+              <a:p>
+                <a:r>
+                  <a:rPr lang="en-US" dirty="0"/>
+                  <a:t>Where </a:t>
+                </a:r>
+                <a14:m>
+                  <m:oMath xmlns:m="http://schemas.openxmlformats.org/officeDocument/2006/math">
+                    <m:r>
+                      <a:rPr lang="en-US" b="0" i="1" smtClean="0">
+                        <a:latin typeface="Cambria Math" panose="02040503050406030204" pitchFamily="18" charset="0"/>
+                      </a:rPr>
+                      <m:t>𝑐</m:t>
+                    </m:r>
+                    <m:d>
+                      <m:dPr>
+                        <m:ctrlPr>
+                          <a:rPr lang="en-US" b="0" i="1" smtClean="0">
+                            <a:latin typeface="Cambria Math" panose="02040503050406030204" pitchFamily="18" charset="0"/>
+                          </a:rPr>
+                        </m:ctrlPr>
+                      </m:dPr>
+                      <m:e>
+                        <m:r>
+                          <a:rPr lang="en-US" b="0" i="1" smtClean="0">
+                            <a:latin typeface="Cambria Math" panose="02040503050406030204" pitchFamily="18" charset="0"/>
+                          </a:rPr>
+                          <m:t>𝜓</m:t>
+                        </m:r>
+                      </m:e>
+                    </m:d>
+                  </m:oMath>
+                </a14:m>
+                <a:r>
+                  <a:rPr lang="en-US" dirty="0"/>
+                  <a:t> is the average of </a:t>
+                </a:r>
+                <a14:m>
+                  <m:oMath xmlns:m="http://schemas.openxmlformats.org/officeDocument/2006/math">
+                    <m:r>
+                      <a:rPr lang="en-US" b="0" i="1" smtClean="0">
+                        <a:latin typeface="Cambria Math" panose="02040503050406030204" pitchFamily="18" charset="0"/>
+                      </a:rPr>
+                      <m:t>h</m:t>
+                    </m:r>
+                    <m:d>
+                      <m:dPr>
+                        <m:ctrlPr>
+                          <a:rPr lang="en-US" b="0" i="1" smtClean="0">
+                            <a:latin typeface="Cambria Math" panose="02040503050406030204" pitchFamily="18" charset="0"/>
+                          </a:rPr>
+                        </m:ctrlPr>
+                      </m:dPr>
+                      <m:e>
+                        <m:r>
+                          <a:rPr lang="en-US" b="0" i="1" smtClean="0">
+                            <a:latin typeface="Cambria Math" panose="02040503050406030204" pitchFamily="18" charset="0"/>
+                          </a:rPr>
+                          <m:t>𝑥</m:t>
+                        </m:r>
+                      </m:e>
+                    </m:d>
+                  </m:oMath>
+                </a14:m>
+                <a:r>
+                  <a:rPr lang="en-US" dirty="0"/>
+                  <a:t> given </a:t>
+                </a:r>
+                <a14:m>
+                  <m:oMath xmlns:m="http://schemas.openxmlformats.org/officeDocument/2006/math">
+                    <m:r>
+                      <a:rPr lang="en-US" b="0" i="1" smtClean="0">
+                        <a:latin typeface="Cambria Math" panose="02040503050406030204" pitchFamily="18" charset="0"/>
+                      </a:rPr>
+                      <m:t>𝜓</m:t>
+                    </m:r>
+                  </m:oMath>
+                </a14:m>
+                <a:r>
+                  <a:rPr lang="en-US" dirty="0"/>
+                  <a:t>, the subsampling</a:t>
+                </a:r>
+                <a:r>
+                  <a:rPr lang="en-US" baseline="0" dirty="0"/>
+                  <a:t> size.</a:t>
+                </a:r>
+                <a:endParaRPr lang="en-IL" dirty="0"/>
+              </a:p>
+            </p:txBody>
+          </p:sp>
+        </mc:Choice>
+        <mc:Fallback>
+          <p:sp>
+            <p:nvSpPr>
+              <p:cNvPr id="3" name="Notes Placeholder 2"/>
+              <p:cNvSpPr>
+                <a:spLocks noGrp="1"/>
+              </p:cNvSpPr>
+              <p:nvPr>
+                <p:ph type="body" idx="1"/>
+              </p:nvPr>
+            </p:nvSpPr>
+            <p:spPr/>
+            <p:txBody>
+              <a:bodyPr/>
+              <a:lstStyle/>
+              <a:p>
+                <a:r>
+                  <a:rPr lang="en-US" dirty="0"/>
+                  <a:t>Isolation-Based Anomaly Detection: </a:t>
+                </a:r>
+                <a:r>
+                  <a:rPr lang="en-US" dirty="0">
+                    <a:hlinkClick r:id="rId3"/>
+                  </a:rPr>
+                  <a:t>https://dl.acm.org/citation.cfm?id=2133363</a:t>
+                </a:r>
+                <a:endParaRPr lang="en-US" dirty="0"/>
+              </a:p>
+              <a:p>
+                <a:endParaRPr lang="en-US" dirty="0"/>
+              </a:p>
+              <a:p>
+                <a:r>
+                  <a:rPr lang="en-US" dirty="0"/>
+                  <a:t>Where </a:t>
+                </a:r>
+                <a:r>
+                  <a:rPr lang="en-US" b="0" i="0">
+                    <a:latin typeface="Cambria Math" panose="02040503050406030204" pitchFamily="18" charset="0"/>
+                  </a:rPr>
+                  <a:t>𝑐(𝜓)</a:t>
+                </a:r>
+                <a:r>
+                  <a:rPr lang="en-US" dirty="0"/>
+                  <a:t> is the average of </a:t>
+                </a:r>
+                <a:r>
+                  <a:rPr lang="en-US" b="0" i="0">
+                    <a:latin typeface="Cambria Math" panose="02040503050406030204" pitchFamily="18" charset="0"/>
+                  </a:rPr>
+                  <a:t>ℎ(𝑥)</a:t>
+                </a:r>
+                <a:r>
+                  <a:rPr lang="en-US" dirty="0"/>
+                  <a:t> given </a:t>
+                </a:r>
+                <a:r>
+                  <a:rPr lang="en-US" b="0" i="0">
+                    <a:latin typeface="Cambria Math" panose="02040503050406030204" pitchFamily="18" charset="0"/>
+                  </a:rPr>
+                  <a:t>𝜓</a:t>
+                </a:r>
+                <a:r>
+                  <a:rPr lang="en-US" dirty="0"/>
+                  <a:t>, the subsampling</a:t>
+                </a:r>
+                <a:r>
+                  <a:rPr lang="en-US" baseline="0" dirty="0"/>
+                  <a:t> size.</a:t>
+                </a:r>
+                <a:endParaRPr lang="en-IL" dirty="0"/>
+              </a:p>
+            </p:txBody>
+          </p:sp>
+        </mc:Fallback>
+      </mc:AlternateContent>
+      <p:sp>
+        <p:nvSpPr>
+          <p:cNvPr id="4" name="Slide Number Placeholder 3"/>
+          <p:cNvSpPr>
+            <a:spLocks noGrp="1"/>
+          </p:cNvSpPr>
+          <p:nvPr>
+            <p:ph type="sldNum" sz="quarter" idx="5"/>
+          </p:nvPr>
+        </p:nvSpPr>
+        <p:spPr/>
+        <p:txBody>
+          <a:bodyPr/>
+          <a:lstStyle/>
+          <a:p>
+            <a:fld id="{C4276747-8356-4D8F-84BF-3C530C5DAF39}" type="slidenum">
+              <a:rPr lang="he-IL" smtClean="0"/>
+              <a:t>36</a:t>
+            </a:fld>
+            <a:endParaRPr lang="he-IL"/>
+          </a:p>
+        </p:txBody>
+      </p:sp>
+    </p:spTree>
+    <p:extLst>
+      <p:ext uri="{BB962C8B-B14F-4D97-AF65-F5344CB8AC3E}">
+        <p14:creationId xmlns:p14="http://schemas.microsoft.com/office/powerpoint/2010/main" val="3642407586"/>
       </p:ext>
     </p:extLst>
   </p:cSld>
@@ -6442,7 +6830,7 @@
                 <a:latin typeface="Courier New" panose="02070309020205020404" pitchFamily="49" charset="0"/>
                 <a:cs typeface="Courier New" panose="02070309020205020404" pitchFamily="49" charset="0"/>
               </a:rPr>
-              <a:t>, </a:t>
+              <a:t>, cluster, </a:t>
             </a:r>
             <a:r>
               <a:rPr lang="en-US" dirty="0" err="1">
@@ -10610,13 +10998,7 @@
                       <a:rPr lang="en-US" b="0" i="1" smtClean="0">
                         <a:latin typeface="Cambria Math" panose="02040503050406030204" pitchFamily="18" charset="0"/>
                       </a:rPr>
-                      <m:t>1</m:t>
-                    </m:r>
-                    <m:r>
-                      <a:rPr lang="en-US" b="0" i="1" smtClean="0">
-                        <a:latin typeface="Cambria Math" panose="02040503050406030204" pitchFamily="18" charset="0"/>
-                      </a:rPr>
-                      <m:t>−</m:t>
+                      <m:t>1−</m:t>
                     </m:r>
                     <m:r>
                       <a:rPr lang="en-US" b="0" i="1" smtClean="0">
@@ -13379,13 +13761,7 @@
                               <a:rPr lang="en-US" sz="2000" b="0" i="1" smtClean="0">
                                 <a:latin typeface="Cambria Math" panose="02040503050406030204" pitchFamily="18" charset="0"/>
                               </a:rPr>
-                              <m:t>−</m:t>
-                            </m:r>
-                            <m:r>
-                              <a:rPr lang="en-US" sz="2000" b="0" i="1" smtClean="0">
-                                <a:latin typeface="Cambria Math" panose="02040503050406030204" pitchFamily="18" charset="0"/>
-                              </a:rPr>
-                              <m:t>4</m:t>
+                              <m:t>−4</m:t>
                             </m:r>
                           </m:e>
                         </m:d>
@@ -13458,13 +13834,7 @@
                               <a:rPr lang="en-US" sz="2000" b="0" i="1" smtClean="0">
                                 <a:latin typeface="Cambria Math" panose="02040503050406030204" pitchFamily="18" charset="0"/>
                               </a:rPr>
-                              <m:t>−</m:t>
-                            </m:r>
-                            <m:r>
-                              <a:rPr lang="en-US" sz="2000" b="0" i="1" smtClean="0">
-                                <a:latin typeface="Cambria Math" panose="02040503050406030204" pitchFamily="18" charset="0"/>
-                              </a:rPr>
-                              <m:t>1</m:t>
+                              <m:t>−1</m:t>
                             </m:r>
                           </m:e>
                         </m:d>
@@ -13513,13 +13883,7 @@
                       <a:rPr lang="en-US" sz="2000" b="0" i="1" smtClean="0">
                         <a:latin typeface="Cambria Math" panose="02040503050406030204" pitchFamily="18" charset="0"/>
                       </a:rPr>
-                      <m:t>=</m:t>
-                    </m:r>
-                    <m:r>
-                      <a:rPr lang="en-US" sz="2000" b="0" i="1" smtClean="0">
-                        <a:latin typeface="Cambria Math" panose="02040503050406030204" pitchFamily="18" charset="0"/>
-                      </a:rPr>
-                      <m:t>18</m:t>
+                      <m:t>=18</m:t>
                     </m:r>
                   </m:oMath>
                 </a14:m>
@@ -14661,7 +15025,7 @@
           <a:p>
             <a:r>
               <a:rPr lang="en-US" dirty="0"/>
-              <a:t>Exercise: in pairs, 5 minutes.</a:t>
+              <a:t>Exercise: in pairs, 10 minutes.</a:t>
             </a:r>
             <a:br>
               <a:rPr lang="en-US" dirty="0"/>
@@ -15444,23 +15808,9 @@
         <p:spPr/>
         <p:txBody>
           <a:bodyPr>
-            <a:normAutofit lnSpcReduction="10000"/>
+            <a:normAutofit/>
           </a:bodyPr>
           <a:lstStyle/>
-          <a:p>
-            <a:r>
-              <a:rPr lang="en-US" dirty="0"/>
-              <a:t>What happens when you don’t know </a:t>
-            </a:r>
-            <a:r>
-              <a:rPr lang="en-US" i="1" dirty="0"/>
-              <a:t>k</a:t>
-            </a:r>
-            <a:r>
-              <a:rPr lang="en-US" dirty="0"/>
-              <a:t> or want a better “mapping”?</a:t>
-            </a:r>
-          </a:p>
           <a:p>
             <a:r>
               <a:rPr lang="en-US" dirty="0"/>
@@ -20670,8 +21020,8 @@
           </a:p>
         </p:txBody>
       </p:sp>
-      <mc:AlternateContent xmlns:mc="http://schemas.openxmlformats.org/markup-compatibility/2006" xmlns:a14="http://schemas.microsoft.com/office/drawing/2010/main">
-        <mc:Choice Requires="a14">
+      <mc:AlternateContent xmlns:mc="http://schemas.openxmlformats.org/markup-compatibility/2006">
+        <mc:Choice xmlns:a14="http://schemas.microsoft.com/office/drawing/2010/main" Requires="a14">
           <p:sp>
             <p:nvSpPr>
               <p:cNvPr id="3" name="Content Placeholder 2">
@@ -20989,7 +21339,15 @@
                 </a14:m>
                 <a:r>
                   <a:rPr lang="en-US" dirty="0"/>
-                  <a:t> uses single linkage.</a:t>
+                  <a:t> uses single linkage (closest point in </a:t>
+                </a:r>
+                <a:r>
+                  <a:rPr lang="en-US" i="1" dirty="0"/>
+                  <a:t>C</a:t>
+                </a:r>
+                <a:r>
+                  <a:rPr lang="en-US" dirty="0"/>
+                  <a:t>).</a:t>
                 </a:r>
               </a:p>
               <a:p>
@@ -21396,7 +21754,7 @@
             </p:txBody>
           </p:sp>
         </mc:Choice>
-        <mc:Fallback xmlns="">
+        <mc:Fallback>
           <p:sp>
             <p:nvSpPr>
               <p:cNvPr id="3" name="Content Placeholder 2">
@@ -21421,7 +21779,7 @@
               <a:blipFill>
                 <a:blip r:embed="rId3"/>
                 <a:stretch>
-                  <a:fillRect l="-234"/>
+                  <a:fillRect l="-234" b="-2257"/>
                 </a:stretch>
               </a:blipFill>
             </p:spPr>
@@ -24921,6 +25279,3396 @@
 </p:sld>
 </file>
 
+<file path=ppt/slides/slide32.xml><?xml version="1.0" encoding="utf-8"?>
+<p:sld xmlns:a="http://schemas.openxmlformats.org/drawingml/2006/main" xmlns:r="http://schemas.openxmlformats.org/officeDocument/2006/relationships" xmlns:p="http://schemas.openxmlformats.org/presentationml/2006/main">
+  <p:cSld>
+    <p:spTree>
+      <p:nvGrpSpPr>
+        <p:cNvPr id="1" name=""/>
+        <p:cNvGrpSpPr/>
+        <p:nvPr/>
+      </p:nvGrpSpPr>
+      <p:grpSpPr>
+        <a:xfrm>
+          <a:off x="0" y="0"/>
+          <a:ext cx="0" cy="0"/>
+          <a:chOff x="0" y="0"/>
+          <a:chExt cx="0" cy="0"/>
+        </a:xfrm>
+      </p:grpSpPr>
+      <p:sp>
+        <p:nvSpPr>
+          <p:cNvPr id="6" name="Title 5">
+            <a:extLst>
+              <a:ext uri="{FF2B5EF4-FFF2-40B4-BE49-F238E27FC236}">
+                <a16:creationId xmlns:a16="http://schemas.microsoft.com/office/drawing/2014/main" id="{DDE9A03D-EDCB-4BDA-9302-B2F491D7E4FF}"/>
+              </a:ext>
+            </a:extLst>
+          </p:cNvPr>
+          <p:cNvSpPr>
+            <a:spLocks noGrp="1"/>
+          </p:cNvSpPr>
+          <p:nvPr>
+            <p:ph type="title"/>
+          </p:nvPr>
+        </p:nvSpPr>
+        <p:spPr/>
+        <p:txBody>
+          <a:bodyPr/>
+          <a:lstStyle/>
+          <a:p>
+            <a:r>
+              <a:rPr lang="en-US" dirty="0"/>
+              <a:t>Bonus: </a:t>
+            </a:r>
+            <a:br>
+              <a:rPr lang="en-US" dirty="0"/>
+            </a:br>
+            <a:r>
+              <a:rPr lang="en-US" dirty="0"/>
+              <a:t>Outlier Detection</a:t>
+            </a:r>
+            <a:endParaRPr lang="en-IL" dirty="0"/>
+          </a:p>
+        </p:txBody>
+      </p:sp>
+      <p:sp>
+        <p:nvSpPr>
+          <p:cNvPr id="7" name="Text Placeholder 6">
+            <a:extLst>
+              <a:ext uri="{FF2B5EF4-FFF2-40B4-BE49-F238E27FC236}">
+                <a16:creationId xmlns:a16="http://schemas.microsoft.com/office/drawing/2014/main" id="{8B5AC94D-4B89-4BD6-9249-A489F515AD70}"/>
+              </a:ext>
+            </a:extLst>
+          </p:cNvPr>
+          <p:cNvSpPr>
+            <a:spLocks noGrp="1"/>
+          </p:cNvSpPr>
+          <p:nvPr>
+            <p:ph type="body" idx="1"/>
+          </p:nvPr>
+        </p:nvSpPr>
+        <p:spPr/>
+        <p:txBody>
+          <a:bodyPr/>
+          <a:lstStyle/>
+          <a:p>
+            <a:endParaRPr lang="en-IL"/>
+          </a:p>
+        </p:txBody>
+      </p:sp>
+      <p:sp>
+        <p:nvSpPr>
+          <p:cNvPr id="4" name="Footer Placeholder 3">
+            <a:extLst>
+              <a:ext uri="{FF2B5EF4-FFF2-40B4-BE49-F238E27FC236}">
+                <a16:creationId xmlns:a16="http://schemas.microsoft.com/office/drawing/2014/main" id="{308AFCD0-E4C5-42FF-BBDB-7B30B65C07FE}"/>
+              </a:ext>
+            </a:extLst>
+          </p:cNvPr>
+          <p:cNvSpPr>
+            <a:spLocks noGrp="1"/>
+          </p:cNvSpPr>
+          <p:nvPr>
+            <p:ph type="ftr" sz="quarter" idx="11"/>
+          </p:nvPr>
+        </p:nvSpPr>
+        <p:spPr/>
+        <p:txBody>
+          <a:bodyPr/>
+          <a:lstStyle/>
+          <a:p>
+            <a:r>
+              <a:rPr lang="en-US"/>
+              <a:t>Materials by Adi Sarid https://adisarid.github.io and http://www.sarid-ins.com</a:t>
+            </a:r>
+            <a:endParaRPr lang="en-US" dirty="0"/>
+          </a:p>
+        </p:txBody>
+      </p:sp>
+      <p:sp>
+        <p:nvSpPr>
+          <p:cNvPr id="5" name="Slide Number Placeholder 4">
+            <a:extLst>
+              <a:ext uri="{FF2B5EF4-FFF2-40B4-BE49-F238E27FC236}">
+                <a16:creationId xmlns:a16="http://schemas.microsoft.com/office/drawing/2014/main" id="{2F35D4AE-FAA3-457B-BA34-4F3837C87587}"/>
+              </a:ext>
+            </a:extLst>
+          </p:cNvPr>
+          <p:cNvSpPr>
+            <a:spLocks noGrp="1"/>
+          </p:cNvSpPr>
+          <p:nvPr>
+            <p:ph type="sldNum" sz="quarter" idx="12"/>
+          </p:nvPr>
+        </p:nvSpPr>
+        <p:spPr/>
+        <p:txBody>
+          <a:bodyPr/>
+          <a:lstStyle/>
+          <a:p>
+            <a:fld id="{4FAB73BC-B049-4115-A692-8D63A059BFB8}" type="slidenum">
+              <a:rPr lang="en-US" smtClean="0"/>
+              <a:t>32</a:t>
+            </a:fld>
+            <a:endParaRPr lang="en-US" dirty="0"/>
+          </a:p>
+        </p:txBody>
+      </p:sp>
+    </p:spTree>
+    <p:extLst>
+      <p:ext uri="{BB962C8B-B14F-4D97-AF65-F5344CB8AC3E}">
+        <p14:creationId xmlns:p14="http://schemas.microsoft.com/office/powerpoint/2010/main" val="96824925"/>
+      </p:ext>
+    </p:extLst>
+  </p:cSld>
+  <p:clrMapOvr>
+    <a:masterClrMapping/>
+  </p:clrMapOvr>
+</p:sld>
+</file>
+
+<file path=ppt/slides/slide33.xml><?xml version="1.0" encoding="utf-8"?>
+<p:sld xmlns:a="http://schemas.openxmlformats.org/drawingml/2006/main" xmlns:r="http://schemas.openxmlformats.org/officeDocument/2006/relationships" xmlns:p="http://schemas.openxmlformats.org/presentationml/2006/main">
+  <p:cSld>
+    <p:spTree>
+      <p:nvGrpSpPr>
+        <p:cNvPr id="1" name=""/>
+        <p:cNvGrpSpPr/>
+        <p:nvPr/>
+      </p:nvGrpSpPr>
+      <p:grpSpPr>
+        <a:xfrm>
+          <a:off x="0" y="0"/>
+          <a:ext cx="0" cy="0"/>
+          <a:chOff x="0" y="0"/>
+          <a:chExt cx="0" cy="0"/>
+        </a:xfrm>
+      </p:grpSpPr>
+      <p:sp>
+        <p:nvSpPr>
+          <p:cNvPr id="6" name="Title 5">
+            <a:extLst>
+              <a:ext uri="{FF2B5EF4-FFF2-40B4-BE49-F238E27FC236}">
+                <a16:creationId xmlns:a16="http://schemas.microsoft.com/office/drawing/2014/main" id="{49C548DB-524D-4F1E-BB05-3558EAD8E692}"/>
+              </a:ext>
+            </a:extLst>
+          </p:cNvPr>
+          <p:cNvSpPr>
+            <a:spLocks noGrp="1"/>
+          </p:cNvSpPr>
+          <p:nvPr>
+            <p:ph type="title"/>
+          </p:nvPr>
+        </p:nvSpPr>
+        <p:spPr/>
+        <p:txBody>
+          <a:bodyPr/>
+          <a:lstStyle/>
+          <a:p>
+            <a:r>
+              <a:rPr lang="en-US" dirty="0"/>
+              <a:t>Sometimes a Boxplot is not Enough</a:t>
+            </a:r>
+            <a:endParaRPr lang="en-IL" dirty="0"/>
+          </a:p>
+        </p:txBody>
+      </p:sp>
+      <p:sp>
+        <p:nvSpPr>
+          <p:cNvPr id="4" name="Footer Placeholder 3">
+            <a:extLst>
+              <a:ext uri="{FF2B5EF4-FFF2-40B4-BE49-F238E27FC236}">
+                <a16:creationId xmlns:a16="http://schemas.microsoft.com/office/drawing/2014/main" id="{5FF0897B-CA46-468F-BC14-1825F47BC70D}"/>
+              </a:ext>
+            </a:extLst>
+          </p:cNvPr>
+          <p:cNvSpPr>
+            <a:spLocks noGrp="1"/>
+          </p:cNvSpPr>
+          <p:nvPr>
+            <p:ph type="ftr" sz="quarter" idx="11"/>
+          </p:nvPr>
+        </p:nvSpPr>
+        <p:spPr/>
+        <p:txBody>
+          <a:bodyPr/>
+          <a:lstStyle/>
+          <a:p>
+            <a:r>
+              <a:rPr lang="en-US"/>
+              <a:t>Materials by Adi Sarid https://adisarid.github.io and http://www.sarid-ins.com</a:t>
+            </a:r>
+            <a:endParaRPr lang="en-US" dirty="0"/>
+          </a:p>
+        </p:txBody>
+      </p:sp>
+      <p:sp>
+        <p:nvSpPr>
+          <p:cNvPr id="5" name="Slide Number Placeholder 4">
+            <a:extLst>
+              <a:ext uri="{FF2B5EF4-FFF2-40B4-BE49-F238E27FC236}">
+                <a16:creationId xmlns:a16="http://schemas.microsoft.com/office/drawing/2014/main" id="{78B14216-89E6-46D6-889A-BD4D9888964F}"/>
+              </a:ext>
+            </a:extLst>
+          </p:cNvPr>
+          <p:cNvSpPr>
+            <a:spLocks noGrp="1"/>
+          </p:cNvSpPr>
+          <p:nvPr>
+            <p:ph type="sldNum" sz="quarter" idx="12"/>
+          </p:nvPr>
+        </p:nvSpPr>
+        <p:spPr/>
+        <p:txBody>
+          <a:bodyPr/>
+          <a:lstStyle/>
+          <a:p>
+            <a:fld id="{4FAB73BC-B049-4115-A692-8D63A059BFB8}" type="slidenum">
+              <a:rPr lang="en-US" smtClean="0"/>
+              <a:pPr/>
+              <a:t>33</a:t>
+            </a:fld>
+            <a:endParaRPr lang="en-US" dirty="0"/>
+          </a:p>
+        </p:txBody>
+      </p:sp>
+      <p:pic>
+        <p:nvPicPr>
+          <p:cNvPr id="11" name="Picture 10">
+            <a:extLst>
+              <a:ext uri="{FF2B5EF4-FFF2-40B4-BE49-F238E27FC236}">
+                <a16:creationId xmlns:a16="http://schemas.microsoft.com/office/drawing/2014/main" id="{5C8EF9F6-A7BA-4F20-9D7F-0A749182A41B}"/>
+              </a:ext>
+            </a:extLst>
+          </p:cNvPr>
+          <p:cNvPicPr>
+            <a:picLocks noChangeAspect="1"/>
+          </p:cNvPicPr>
+          <p:nvPr/>
+        </p:nvPicPr>
+        <p:blipFill>
+          <a:blip r:embed="rId2"/>
+          <a:stretch>
+            <a:fillRect/>
+          </a:stretch>
+        </p:blipFill>
+        <p:spPr>
+          <a:xfrm>
+            <a:off x="6096000" y="2093976"/>
+            <a:ext cx="4405014" cy="3906333"/>
+          </a:xfrm>
+          <a:prstGeom prst="rect">
+            <a:avLst/>
+          </a:prstGeom>
+        </p:spPr>
+      </p:pic>
+      <p:sp>
+        <p:nvSpPr>
+          <p:cNvPr id="12" name="TextBox 11">
+            <a:extLst>
+              <a:ext uri="{FF2B5EF4-FFF2-40B4-BE49-F238E27FC236}">
+                <a16:creationId xmlns:a16="http://schemas.microsoft.com/office/drawing/2014/main" id="{5CC9E551-A752-45C0-BB48-D29E6A1BB372}"/>
+              </a:ext>
+            </a:extLst>
+          </p:cNvPr>
+          <p:cNvSpPr txBox="1"/>
+          <p:nvPr/>
+        </p:nvSpPr>
+        <p:spPr>
+          <a:xfrm>
+            <a:off x="1088136" y="2951921"/>
+            <a:ext cx="4718296" cy="1477328"/>
+          </a:xfrm>
+          <a:prstGeom prst="rect">
+            <a:avLst/>
+          </a:prstGeom>
+          <a:noFill/>
+        </p:spPr>
+        <p:txBody>
+          <a:bodyPr wrap="square" rtlCol="0">
+            <a:spAutoFit/>
+          </a:bodyPr>
+          <a:lstStyle/>
+          <a:p>
+            <a:pPr marL="285750" indent="-285750">
+              <a:buFont typeface="Arial" panose="020B0604020202020204" pitchFamily="34" charset="0"/>
+              <a:buChar char="•"/>
+            </a:pPr>
+            <a:r>
+              <a:rPr lang="en-US" dirty="0"/>
+              <a:t>Clearly, there is an outlier, but it will not appear as such when using individual boxplots.</a:t>
+            </a:r>
+          </a:p>
+          <a:p>
+            <a:pPr marL="285750" indent="-285750">
+              <a:buFont typeface="Arial" panose="020B0604020202020204" pitchFamily="34" charset="0"/>
+              <a:buChar char="•"/>
+            </a:pPr>
+            <a:endParaRPr lang="en-US" dirty="0"/>
+          </a:p>
+          <a:p>
+            <a:pPr marL="285750" indent="-285750">
+              <a:buFont typeface="Arial" panose="020B0604020202020204" pitchFamily="34" charset="0"/>
+              <a:buChar char="•"/>
+            </a:pPr>
+            <a:r>
+              <a:rPr lang="en-US" dirty="0"/>
+              <a:t>How can we detect such outliers?</a:t>
+            </a:r>
+            <a:endParaRPr lang="en-IL" dirty="0"/>
+          </a:p>
+        </p:txBody>
+      </p:sp>
+    </p:spTree>
+    <p:extLst>
+      <p:ext uri="{BB962C8B-B14F-4D97-AF65-F5344CB8AC3E}">
+        <p14:creationId xmlns:p14="http://schemas.microsoft.com/office/powerpoint/2010/main" val="3093700272"/>
+      </p:ext>
+    </p:extLst>
+  </p:cSld>
+  <p:clrMapOvr>
+    <a:masterClrMapping/>
+  </p:clrMapOvr>
+</p:sld>
+</file>
+
+<file path=ppt/slides/slide34.xml><?xml version="1.0" encoding="utf-8"?>
+<p:sld xmlns:a="http://schemas.openxmlformats.org/drawingml/2006/main" xmlns:r="http://schemas.openxmlformats.org/officeDocument/2006/relationships" xmlns:p="http://schemas.openxmlformats.org/presentationml/2006/main">
+  <p:cSld>
+    <p:spTree>
+      <p:nvGrpSpPr>
+        <p:cNvPr id="1" name=""/>
+        <p:cNvGrpSpPr/>
+        <p:nvPr/>
+      </p:nvGrpSpPr>
+      <p:grpSpPr>
+        <a:xfrm>
+          <a:off x="0" y="0"/>
+          <a:ext cx="0" cy="0"/>
+          <a:chOff x="0" y="0"/>
+          <a:chExt cx="0" cy="0"/>
+        </a:xfrm>
+      </p:grpSpPr>
+      <p:sp>
+        <p:nvSpPr>
+          <p:cNvPr id="2" name="Title 1">
+            <a:extLst>
+              <a:ext uri="{FF2B5EF4-FFF2-40B4-BE49-F238E27FC236}">
+                <a16:creationId xmlns:a16="http://schemas.microsoft.com/office/drawing/2014/main" id="{248C3F1A-79DE-4BE7-851D-D648B3DC82D1}"/>
+              </a:ext>
+            </a:extLst>
+          </p:cNvPr>
+          <p:cNvSpPr>
+            <a:spLocks noGrp="1"/>
+          </p:cNvSpPr>
+          <p:nvPr>
+            <p:ph type="title"/>
+          </p:nvPr>
+        </p:nvSpPr>
+        <p:spPr/>
+        <p:txBody>
+          <a:bodyPr/>
+          <a:lstStyle/>
+          <a:p>
+            <a:r>
+              <a:rPr lang="en-US" dirty="0"/>
+              <a:t>Local Outlier Factor</a:t>
+            </a:r>
+            <a:endParaRPr lang="en-IL" dirty="0"/>
+          </a:p>
+        </p:txBody>
+      </p:sp>
+      <mc:AlternateContent xmlns:mc="http://schemas.openxmlformats.org/markup-compatibility/2006">
+        <mc:Choice xmlns:a14="http://schemas.microsoft.com/office/drawing/2010/main" Requires="a14">
+          <p:sp>
+            <p:nvSpPr>
+              <p:cNvPr id="3" name="Content Placeholder 2">
+                <a:extLst>
+                  <a:ext uri="{FF2B5EF4-FFF2-40B4-BE49-F238E27FC236}">
+                    <a16:creationId xmlns:a16="http://schemas.microsoft.com/office/drawing/2014/main" id="{3BEC0D32-E596-4419-AC28-135573C194E4}"/>
+                  </a:ext>
+                </a:extLst>
+              </p:cNvPr>
+              <p:cNvSpPr>
+                <a:spLocks noGrp="1"/>
+              </p:cNvSpPr>
+              <p:nvPr>
+                <p:ph idx="1"/>
+              </p:nvPr>
+            </p:nvSpPr>
+            <p:spPr/>
+            <p:txBody>
+              <a:bodyPr>
+                <a:normAutofit fontScale="92500" lnSpcReduction="10000"/>
+              </a:bodyPr>
+              <a:lstStyle/>
+              <a:p>
+                <a14:m>
+                  <m:oMath xmlns:m="http://schemas.openxmlformats.org/officeDocument/2006/math">
+                    <m:r>
+                      <a:rPr lang="en-US" sz="1800" b="0" i="1" smtClean="0">
+                        <a:latin typeface="Cambria Math" panose="02040503050406030204" pitchFamily="18" charset="0"/>
+                      </a:rPr>
+                      <m:t>𝑘</m:t>
+                    </m:r>
+                    <m:r>
+                      <m:rPr>
+                        <m:nor/>
+                      </m:rPr>
+                      <a:rPr lang="en-US" sz="1800" b="0" i="0" smtClean="0">
+                        <a:latin typeface="Cambria Math" panose="02040503050406030204" pitchFamily="18" charset="0"/>
+                      </a:rPr>
+                      <m:t>-</m:t>
+                    </m:r>
+                    <m:r>
+                      <m:rPr>
+                        <m:nor/>
+                      </m:rPr>
+                      <a:rPr lang="en-US" sz="1800" b="0" i="0" smtClean="0">
+                        <a:latin typeface="Cambria Math" panose="02040503050406030204" pitchFamily="18" charset="0"/>
+                      </a:rPr>
+                      <m:t>distance</m:t>
+                    </m:r>
+                    <m:d>
+                      <m:dPr>
+                        <m:ctrlPr>
+                          <a:rPr lang="en-US" sz="1800" b="0" i="1" smtClean="0">
+                            <a:latin typeface="Cambria Math" panose="02040503050406030204" pitchFamily="18" charset="0"/>
+                          </a:rPr>
+                        </m:ctrlPr>
+                      </m:dPr>
+                      <m:e>
+                        <m:r>
+                          <a:rPr lang="en-US" sz="1800" b="0" i="1" smtClean="0">
+                            <a:latin typeface="Cambria Math" panose="02040503050406030204" pitchFamily="18" charset="0"/>
+                          </a:rPr>
+                          <m:t>𝑥</m:t>
+                        </m:r>
+                      </m:e>
+                    </m:d>
+                  </m:oMath>
+                </a14:m>
+                <a:r>
+                  <a:rPr lang="en-US" sz="1800" dirty="0"/>
+                  <a:t> = the distance of </a:t>
+                </a:r>
+                <a14:m>
+                  <m:oMath xmlns:m="http://schemas.openxmlformats.org/officeDocument/2006/math">
+                    <m:r>
+                      <a:rPr lang="en-US" sz="1800" b="0" i="1" smtClean="0">
+                        <a:latin typeface="Cambria Math" panose="02040503050406030204" pitchFamily="18" charset="0"/>
+                      </a:rPr>
+                      <m:t>𝑥</m:t>
+                    </m:r>
+                  </m:oMath>
+                </a14:m>
+                <a:r>
+                  <a:rPr lang="en-US" sz="1800" dirty="0"/>
+                  <a:t> to its </a:t>
+                </a:r>
+                <a14:m>
+                  <m:oMath xmlns:m="http://schemas.openxmlformats.org/officeDocument/2006/math">
+                    <m:sSup>
+                      <m:sSupPr>
+                        <m:ctrlPr>
+                          <a:rPr lang="en-US" sz="1800" b="0" i="0" smtClean="0">
+                            <a:latin typeface="Cambria Math" panose="02040503050406030204" pitchFamily="18" charset="0"/>
+                          </a:rPr>
+                        </m:ctrlPr>
+                      </m:sSupPr>
+                      <m:e>
+                        <m:r>
+                          <a:rPr lang="en-US" sz="1800" b="0" i="1" smtClean="0">
+                            <a:latin typeface="Cambria Math" panose="02040503050406030204" pitchFamily="18" charset="0"/>
+                          </a:rPr>
+                          <m:t>𝑘</m:t>
+                        </m:r>
+                      </m:e>
+                      <m:sup>
+                        <m:r>
+                          <m:rPr>
+                            <m:sty m:val="p"/>
+                          </m:rPr>
+                          <a:rPr lang="en-US" sz="1800" b="0" i="0" smtClean="0">
+                            <a:latin typeface="Cambria Math" panose="02040503050406030204" pitchFamily="18" charset="0"/>
+                          </a:rPr>
+                          <m:t>th</m:t>
+                        </m:r>
+                      </m:sup>
+                    </m:sSup>
+                  </m:oMath>
+                </a14:m>
+                <a:r>
+                  <a:rPr lang="en-US" sz="1800" dirty="0"/>
+                  <a:t> nearest neighbor.</a:t>
+                </a:r>
+              </a:p>
+              <a:p>
+                <a:r>
+                  <a:rPr lang="en-US" sz="1800" dirty="0"/>
+                  <a:t>Denote </a:t>
+                </a:r>
+                <a14:m>
+                  <m:oMath xmlns:m="http://schemas.openxmlformats.org/officeDocument/2006/math">
+                    <m:sSub>
+                      <m:sSubPr>
+                        <m:ctrlPr>
+                          <a:rPr lang="en-US" sz="1800" b="0" i="1" smtClean="0">
+                            <a:latin typeface="Cambria Math" panose="02040503050406030204" pitchFamily="18" charset="0"/>
+                          </a:rPr>
+                        </m:ctrlPr>
+                      </m:sSubPr>
+                      <m:e>
+                        <m:r>
+                          <a:rPr lang="en-US" sz="1800" b="0" i="1" smtClean="0">
+                            <a:latin typeface="Cambria Math" panose="02040503050406030204" pitchFamily="18" charset="0"/>
+                          </a:rPr>
+                          <m:t>𝑁</m:t>
+                        </m:r>
+                      </m:e>
+                      <m:sub>
+                        <m:r>
+                          <a:rPr lang="en-US" sz="1800" b="0" i="1" smtClean="0">
+                            <a:latin typeface="Cambria Math" panose="02040503050406030204" pitchFamily="18" charset="0"/>
+                          </a:rPr>
+                          <m:t>𝑘</m:t>
+                        </m:r>
+                      </m:sub>
+                    </m:sSub>
+                    <m:d>
+                      <m:dPr>
+                        <m:ctrlPr>
+                          <a:rPr lang="en-US" sz="1800" b="0" i="1" smtClean="0">
+                            <a:latin typeface="Cambria Math" panose="02040503050406030204" pitchFamily="18" charset="0"/>
+                          </a:rPr>
+                        </m:ctrlPr>
+                      </m:dPr>
+                      <m:e>
+                        <m:r>
+                          <a:rPr lang="en-US" sz="1800" b="0" i="1" smtClean="0">
+                            <a:latin typeface="Cambria Math" panose="02040503050406030204" pitchFamily="18" charset="0"/>
+                          </a:rPr>
+                          <m:t>𝑥</m:t>
+                        </m:r>
+                      </m:e>
+                    </m:d>
+                  </m:oMath>
+                </a14:m>
+                <a:r>
+                  <a:rPr lang="en-US" sz="1800" dirty="0"/>
+                  <a:t>= the set of </a:t>
+                </a:r>
+                <a14:m>
+                  <m:oMath xmlns:m="http://schemas.openxmlformats.org/officeDocument/2006/math">
+                    <m:r>
+                      <a:rPr lang="en-US" sz="1800" b="0" i="1" smtClean="0">
+                        <a:latin typeface="Cambria Math" panose="02040503050406030204" pitchFamily="18" charset="0"/>
+                      </a:rPr>
+                      <m:t>𝑥</m:t>
+                    </m:r>
+                  </m:oMath>
+                </a14:m>
+                <a:r>
+                  <a:rPr lang="en-US" sz="1800" dirty="0"/>
+                  <a:t>’s </a:t>
+                </a:r>
+                <a14:m>
+                  <m:oMath xmlns:m="http://schemas.openxmlformats.org/officeDocument/2006/math">
+                    <m:r>
+                      <a:rPr lang="en-US" sz="1800" b="0" i="1" smtClean="0">
+                        <a:latin typeface="Cambria Math" panose="02040503050406030204" pitchFamily="18" charset="0"/>
+                      </a:rPr>
+                      <m:t>𝑘</m:t>
+                    </m:r>
+                  </m:oMath>
+                </a14:m>
+                <a:r>
+                  <a:rPr lang="en-US" sz="1800" dirty="0"/>
+                  <a:t> nearest neighbors.</a:t>
+                </a:r>
+              </a:p>
+              <a:p>
+                <a:r>
+                  <a:rPr lang="en-US" sz="1800" dirty="0"/>
+                  <a:t>Define the </a:t>
+                </a:r>
+                <a:r>
+                  <a:rPr lang="en-US" sz="1800" b="1" dirty="0"/>
+                  <a:t>reachability distance </a:t>
+                </a:r>
+                <a:r>
+                  <a:rPr lang="en-US" sz="1800" dirty="0"/>
+                  <a:t>(from </a:t>
+                </a:r>
+                <a14:m>
+                  <m:oMath xmlns:m="http://schemas.openxmlformats.org/officeDocument/2006/math">
+                    <m:r>
+                      <a:rPr lang="en-US" sz="1800" i="1" dirty="0" smtClean="0">
+                        <a:latin typeface="Cambria Math" panose="02040503050406030204" pitchFamily="18" charset="0"/>
+                      </a:rPr>
+                      <m:t>𝑦</m:t>
+                    </m:r>
+                  </m:oMath>
+                </a14:m>
+                <a:r>
+                  <a:rPr lang="en-US" sz="1800" dirty="0"/>
+                  <a:t> to </a:t>
+                </a:r>
+                <a14:m>
+                  <m:oMath xmlns:m="http://schemas.openxmlformats.org/officeDocument/2006/math">
+                    <m:r>
+                      <a:rPr lang="en-US" sz="1800" i="1" dirty="0" smtClean="0">
+                        <a:latin typeface="Cambria Math" panose="02040503050406030204" pitchFamily="18" charset="0"/>
+                      </a:rPr>
+                      <m:t>𝑥</m:t>
+                    </m:r>
+                  </m:oMath>
+                </a14:m>
+                <a:r>
+                  <a:rPr lang="en-US" sz="1800" dirty="0"/>
+                  <a:t>):</a:t>
+                </a:r>
+              </a:p>
+              <a:p>
+                <a:pPr marL="0" indent="0">
+                  <a:buNone/>
+                </a:pPr>
+                <a14:m>
+                  <m:oMathPara xmlns:m="http://schemas.openxmlformats.org/officeDocument/2006/math">
+                    <m:oMathParaPr>
+                      <m:jc m:val="centerGroup"/>
+                    </m:oMathParaPr>
+                    <m:oMath xmlns:m="http://schemas.openxmlformats.org/officeDocument/2006/math">
+                      <m:sSub>
+                        <m:sSubPr>
+                          <m:ctrlPr>
+                            <a:rPr lang="en-US" sz="1800" b="0" i="1" smtClean="0">
+                              <a:latin typeface="Cambria Math" panose="02040503050406030204" pitchFamily="18" charset="0"/>
+                            </a:rPr>
+                          </m:ctrlPr>
+                        </m:sSubPr>
+                        <m:e>
+                          <m:r>
+                            <m:rPr>
+                              <m:nor/>
+                            </m:rPr>
+                            <a:rPr lang="en-US" sz="1800" b="0" i="0" smtClean="0">
+                              <a:latin typeface="Cambria Math" panose="02040503050406030204" pitchFamily="18" charset="0"/>
+                            </a:rPr>
+                            <m:t>reachability</m:t>
+                          </m:r>
+                          <m:r>
+                            <m:rPr>
+                              <m:nor/>
+                            </m:rPr>
+                            <a:rPr lang="en-US" sz="1800" b="0" i="0" smtClean="0">
+                              <a:latin typeface="Cambria Math" panose="02040503050406030204" pitchFamily="18" charset="0"/>
+                            </a:rPr>
+                            <m:t>-</m:t>
+                          </m:r>
+                          <m:r>
+                            <m:rPr>
+                              <m:nor/>
+                            </m:rPr>
+                            <a:rPr lang="en-US" sz="1800" b="0" i="0" smtClean="0">
+                              <a:latin typeface="Cambria Math" panose="02040503050406030204" pitchFamily="18" charset="0"/>
+                            </a:rPr>
+                            <m:t>distance</m:t>
+                          </m:r>
+                        </m:e>
+                        <m:sub>
+                          <m:r>
+                            <a:rPr lang="en-US" sz="1800" b="0" i="1" smtClean="0">
+                              <a:latin typeface="Cambria Math" panose="02040503050406030204" pitchFamily="18" charset="0"/>
+                            </a:rPr>
+                            <m:t>𝑘</m:t>
+                          </m:r>
+                        </m:sub>
+                      </m:sSub>
+                      <m:d>
+                        <m:dPr>
+                          <m:ctrlPr>
+                            <a:rPr lang="en-US" sz="1800" b="0" i="1" smtClean="0">
+                              <a:latin typeface="Cambria Math" panose="02040503050406030204" pitchFamily="18" charset="0"/>
+                            </a:rPr>
+                          </m:ctrlPr>
+                        </m:dPr>
+                        <m:e>
+                          <m:r>
+                            <a:rPr lang="en-US" sz="1800" b="0" i="1" smtClean="0">
+                              <a:latin typeface="Cambria Math" panose="02040503050406030204" pitchFamily="18" charset="0"/>
+                            </a:rPr>
+                            <m:t>𝑥</m:t>
+                          </m:r>
+                          <m:r>
+                            <a:rPr lang="en-US" sz="1800" b="0" i="1" smtClean="0">
+                              <a:latin typeface="Cambria Math" panose="02040503050406030204" pitchFamily="18" charset="0"/>
+                            </a:rPr>
+                            <m:t>,</m:t>
+                          </m:r>
+                          <m:r>
+                            <a:rPr lang="en-US" sz="1800" b="0" i="1" smtClean="0">
+                              <a:latin typeface="Cambria Math" panose="02040503050406030204" pitchFamily="18" charset="0"/>
+                            </a:rPr>
+                            <m:t>𝑦</m:t>
+                          </m:r>
+                        </m:e>
+                      </m:d>
+                      <m:r>
+                        <a:rPr lang="en-US" sz="1800" b="0" i="1" smtClean="0">
+                          <a:latin typeface="Cambria Math" panose="02040503050406030204" pitchFamily="18" charset="0"/>
+                        </a:rPr>
+                        <m:t>=</m:t>
+                      </m:r>
+                      <m:func>
+                        <m:funcPr>
+                          <m:ctrlPr>
+                            <a:rPr lang="en-US" sz="1800" b="0" i="1" smtClean="0">
+                              <a:latin typeface="Cambria Math" panose="02040503050406030204" pitchFamily="18" charset="0"/>
+                            </a:rPr>
+                          </m:ctrlPr>
+                        </m:funcPr>
+                        <m:fName>
+                          <m:r>
+                            <m:rPr>
+                              <m:sty m:val="p"/>
+                            </m:rPr>
+                            <a:rPr lang="en-US" sz="1800" b="0" i="0" smtClean="0">
+                              <a:latin typeface="Cambria Math" panose="02040503050406030204" pitchFamily="18" charset="0"/>
+                            </a:rPr>
+                            <m:t>max</m:t>
+                          </m:r>
+                        </m:fName>
+                        <m:e>
+                          <m:d>
+                            <m:dPr>
+                              <m:begChr m:val="{"/>
+                              <m:endChr m:val="}"/>
+                              <m:ctrlPr>
+                                <a:rPr lang="en-US" sz="1800" b="0" i="1" smtClean="0">
+                                  <a:latin typeface="Cambria Math" panose="02040503050406030204" pitchFamily="18" charset="0"/>
+                                </a:rPr>
+                              </m:ctrlPr>
+                            </m:dPr>
+                            <m:e>
+                              <m:r>
+                                <a:rPr lang="en-US" sz="1800" i="1">
+                                  <a:latin typeface="Cambria Math" panose="02040503050406030204" pitchFamily="18" charset="0"/>
+                                </a:rPr>
+                                <m:t>𝑘</m:t>
+                              </m:r>
+                              <m:r>
+                                <m:rPr>
+                                  <m:nor/>
+                                </m:rPr>
+                                <a:rPr lang="en-US" sz="1800" i="0">
+                                  <a:latin typeface="Cambria Math" panose="02040503050406030204" pitchFamily="18" charset="0"/>
+                                </a:rPr>
+                                <m:t>-</m:t>
+                              </m:r>
+                              <m:r>
+                                <m:rPr>
+                                  <m:nor/>
+                                </m:rPr>
+                                <a:rPr lang="en-US" sz="1800">
+                                  <a:latin typeface="Cambria Math" panose="02040503050406030204" pitchFamily="18" charset="0"/>
+                                </a:rPr>
+                                <m:t>distance</m:t>
+                              </m:r>
+                              <m:d>
+                                <m:dPr>
+                                  <m:ctrlPr>
+                                    <a:rPr lang="en-US" sz="1800" b="0" i="1" smtClean="0">
+                                      <a:latin typeface="Cambria Math" panose="02040503050406030204" pitchFamily="18" charset="0"/>
+                                    </a:rPr>
+                                  </m:ctrlPr>
+                                </m:dPr>
+                                <m:e>
+                                  <m:r>
+                                    <a:rPr lang="en-US" sz="1800" b="0" i="1" smtClean="0">
+                                      <a:latin typeface="Cambria Math" panose="02040503050406030204" pitchFamily="18" charset="0"/>
+                                    </a:rPr>
+                                    <m:t>𝑦</m:t>
+                                  </m:r>
+                                </m:e>
+                              </m:d>
+                              <m:r>
+                                <a:rPr lang="en-US" sz="1800" b="0" i="1" smtClean="0">
+                                  <a:latin typeface="Cambria Math" panose="02040503050406030204" pitchFamily="18" charset="0"/>
+                                </a:rPr>
+                                <m:t>,</m:t>
+                              </m:r>
+                              <m:r>
+                                <a:rPr lang="en-US" sz="1800" b="0" i="1" smtClean="0">
+                                  <a:latin typeface="Cambria Math" panose="02040503050406030204" pitchFamily="18" charset="0"/>
+                                </a:rPr>
+                                <m:t>𝑑</m:t>
+                              </m:r>
+                              <m:d>
+                                <m:dPr>
+                                  <m:ctrlPr>
+                                    <a:rPr lang="en-US" sz="1800" b="0" i="1" smtClean="0">
+                                      <a:latin typeface="Cambria Math" panose="02040503050406030204" pitchFamily="18" charset="0"/>
+                                    </a:rPr>
+                                  </m:ctrlPr>
+                                </m:dPr>
+                                <m:e>
+                                  <m:r>
+                                    <a:rPr lang="en-US" sz="1800" b="0" i="1" smtClean="0">
+                                      <a:latin typeface="Cambria Math" panose="02040503050406030204" pitchFamily="18" charset="0"/>
+                                    </a:rPr>
+                                    <m:t>𝑥</m:t>
+                                  </m:r>
+                                  <m:r>
+                                    <a:rPr lang="en-US" sz="1800" b="0" i="1" smtClean="0">
+                                      <a:latin typeface="Cambria Math" panose="02040503050406030204" pitchFamily="18" charset="0"/>
+                                    </a:rPr>
+                                    <m:t>,</m:t>
+                                  </m:r>
+                                  <m:r>
+                                    <a:rPr lang="en-US" sz="1800" b="0" i="1" smtClean="0">
+                                      <a:latin typeface="Cambria Math" panose="02040503050406030204" pitchFamily="18" charset="0"/>
+                                    </a:rPr>
+                                    <m:t>𝑦</m:t>
+                                  </m:r>
+                                </m:e>
+                              </m:d>
+                            </m:e>
+                          </m:d>
+                        </m:e>
+                      </m:func>
+                      <m:r>
+                        <a:rPr lang="en-US" sz="1800" b="0" i="1" smtClean="0">
+                          <a:latin typeface="Cambria Math" panose="02040503050406030204" pitchFamily="18" charset="0"/>
+                        </a:rPr>
+                        <m:t> </m:t>
+                      </m:r>
+                    </m:oMath>
+                  </m:oMathPara>
+                </a14:m>
+                <a:endParaRPr lang="en-US" sz="1800" dirty="0"/>
+              </a:p>
+              <a:p>
+                <a:pPr lvl="1"/>
+                <a:r>
+                  <a:rPr lang="en-US" sz="1600" dirty="0"/>
+                  <a:t>(</a:t>
+                </a:r>
+                <a14:m>
+                  <m:oMath xmlns:m="http://schemas.openxmlformats.org/officeDocument/2006/math">
+                    <m:r>
+                      <a:rPr lang="en-US" sz="1600" i="1" dirty="0" smtClean="0">
+                        <a:latin typeface="Cambria Math" panose="02040503050406030204" pitchFamily="18" charset="0"/>
+                      </a:rPr>
+                      <m:t>𝑦</m:t>
+                    </m:r>
+                  </m:oMath>
+                </a14:m>
+                <a:r>
+                  <a:rPr lang="en-US" sz="1600" dirty="0"/>
+                  <a:t>’s distance to its </a:t>
+                </a:r>
+                <a14:m>
+                  <m:oMath xmlns:m="http://schemas.openxmlformats.org/officeDocument/2006/math">
+                    <m:sSup>
+                      <m:sSupPr>
+                        <m:ctrlPr>
+                          <a:rPr lang="en-US" sz="1600" i="1" dirty="0" smtClean="0">
+                            <a:latin typeface="Cambria Math" panose="02040503050406030204" pitchFamily="18" charset="0"/>
+                          </a:rPr>
+                        </m:ctrlPr>
+                      </m:sSupPr>
+                      <m:e>
+                        <m:r>
+                          <a:rPr lang="en-US" sz="1600" i="1" dirty="0" smtClean="0">
+                            <a:latin typeface="Cambria Math" panose="02040503050406030204" pitchFamily="18" charset="0"/>
+                          </a:rPr>
+                          <m:t>𝑘</m:t>
+                        </m:r>
+                      </m:e>
+                      <m:sup>
+                        <m:r>
+                          <m:rPr>
+                            <m:nor/>
+                          </m:rPr>
+                          <a:rPr lang="en-US" sz="1600" b="0" i="0" dirty="0" smtClean="0">
+                            <a:latin typeface="Cambria Math" panose="02040503050406030204" pitchFamily="18" charset="0"/>
+                          </a:rPr>
+                          <m:t>th</m:t>
+                        </m:r>
+                      </m:sup>
+                    </m:sSup>
+                  </m:oMath>
+                </a14:m>
+                <a:r>
+                  <a:rPr lang="en-US" sz="1600" dirty="0"/>
+                  <a:t> neighbor or the distance to </a:t>
+                </a:r>
+                <a14:m>
+                  <m:oMath xmlns:m="http://schemas.openxmlformats.org/officeDocument/2006/math">
+                    <m:r>
+                      <a:rPr lang="en-US" sz="1600" i="1" dirty="0" smtClean="0">
+                        <a:latin typeface="Cambria Math" panose="02040503050406030204" pitchFamily="18" charset="0"/>
+                      </a:rPr>
+                      <m:t>𝑥</m:t>
+                    </m:r>
+                  </m:oMath>
+                </a14:m>
+                <a:r>
+                  <a:rPr lang="en-US" sz="1600" dirty="0"/>
+                  <a:t>, the max of the two)</a:t>
+                </a:r>
+              </a:p>
+              <a:p>
+                <a:r>
+                  <a:rPr lang="en-US" sz="1800" dirty="0"/>
+                  <a:t>The </a:t>
+                </a:r>
+                <a:r>
+                  <a:rPr lang="en-US" sz="1800" b="1" dirty="0"/>
+                  <a:t>local reachability distance </a:t>
+                </a:r>
+                <a:r>
+                  <a:rPr lang="en-US" sz="1800" dirty="0"/>
+                  <a:t>of </a:t>
+                </a:r>
+                <a14:m>
+                  <m:oMath xmlns:m="http://schemas.openxmlformats.org/officeDocument/2006/math">
+                    <m:r>
+                      <a:rPr lang="en-US" sz="1800" i="1" dirty="0" smtClean="0">
+                        <a:latin typeface="Cambria Math" panose="02040503050406030204" pitchFamily="18" charset="0"/>
+                      </a:rPr>
+                      <m:t>𝑥</m:t>
+                    </m:r>
+                  </m:oMath>
+                </a14:m>
+                <a:r>
+                  <a:rPr lang="en-US" sz="1800" dirty="0"/>
+                  <a:t> is defined as:</a:t>
+                </a:r>
+              </a:p>
+              <a:p>
+                <a:pPr marL="0" indent="0">
+                  <a:buNone/>
+                </a:pPr>
+                <a14:m>
+                  <m:oMathPara xmlns:m="http://schemas.openxmlformats.org/officeDocument/2006/math">
+                    <m:oMathParaPr>
+                      <m:jc m:val="centerGroup"/>
+                    </m:oMathParaPr>
+                    <m:oMath xmlns:m="http://schemas.openxmlformats.org/officeDocument/2006/math">
+                      <m:r>
+                        <m:rPr>
+                          <m:nor/>
+                        </m:rPr>
+                        <a:rPr lang="en-US" sz="1800" b="0" i="0" smtClean="0">
+                          <a:latin typeface="Cambria Math" panose="02040503050406030204" pitchFamily="18" charset="0"/>
+                        </a:rPr>
+                        <m:t>lr</m:t>
+                      </m:r>
+                      <m:sSub>
+                        <m:sSubPr>
+                          <m:ctrlPr>
+                            <a:rPr lang="en-US" sz="1800" b="0" i="1" smtClean="0">
+                              <a:latin typeface="Cambria Math" panose="02040503050406030204" pitchFamily="18" charset="0"/>
+                            </a:rPr>
+                          </m:ctrlPr>
+                        </m:sSubPr>
+                        <m:e>
+                          <m:r>
+                            <m:rPr>
+                              <m:nor/>
+                            </m:rPr>
+                            <a:rPr lang="en-US" sz="1800" b="0" i="0" smtClean="0">
+                              <a:latin typeface="Cambria Math" panose="02040503050406030204" pitchFamily="18" charset="0"/>
+                            </a:rPr>
+                            <m:t>d</m:t>
+                          </m:r>
+                        </m:e>
+                        <m:sub>
+                          <m:r>
+                            <a:rPr lang="en-US" sz="1800" b="0" i="1" smtClean="0">
+                              <a:latin typeface="Cambria Math" panose="02040503050406030204" pitchFamily="18" charset="0"/>
+                            </a:rPr>
+                            <m:t>𝑘</m:t>
+                          </m:r>
+                        </m:sub>
+                      </m:sSub>
+                      <m:d>
+                        <m:dPr>
+                          <m:ctrlPr>
+                            <a:rPr lang="en-US" sz="1800" b="0" i="1" smtClean="0">
+                              <a:latin typeface="Cambria Math" panose="02040503050406030204" pitchFamily="18" charset="0"/>
+                            </a:rPr>
+                          </m:ctrlPr>
+                        </m:dPr>
+                        <m:e>
+                          <m:r>
+                            <a:rPr lang="en-US" sz="1800" b="0" i="1" smtClean="0">
+                              <a:latin typeface="Cambria Math" panose="02040503050406030204" pitchFamily="18" charset="0"/>
+                            </a:rPr>
+                            <m:t>𝑥</m:t>
+                          </m:r>
+                        </m:e>
+                      </m:d>
+                      <m:r>
+                        <a:rPr lang="en-US" sz="1800" b="0" i="1" smtClean="0">
+                          <a:latin typeface="Cambria Math" panose="02040503050406030204" pitchFamily="18" charset="0"/>
+                        </a:rPr>
+                        <m:t>=</m:t>
+                      </m:r>
+                      <m:sSup>
+                        <m:sSupPr>
+                          <m:ctrlPr>
+                            <a:rPr lang="en-US" sz="1800" b="0" i="1" smtClean="0">
+                              <a:latin typeface="Cambria Math" panose="02040503050406030204" pitchFamily="18" charset="0"/>
+                            </a:rPr>
+                          </m:ctrlPr>
+                        </m:sSupPr>
+                        <m:e>
+                          <m:d>
+                            <m:dPr>
+                              <m:ctrlPr>
+                                <a:rPr lang="en-US" sz="1800" b="0" i="1" smtClean="0">
+                                  <a:latin typeface="Cambria Math" panose="02040503050406030204" pitchFamily="18" charset="0"/>
+                                </a:rPr>
+                              </m:ctrlPr>
+                            </m:dPr>
+                            <m:e>
+                              <m:nary>
+                                <m:naryPr>
+                                  <m:chr m:val="∑"/>
+                                  <m:supHide m:val="on"/>
+                                  <m:ctrlPr>
+                                    <a:rPr lang="en-US" sz="1800" b="0" i="1" smtClean="0">
+                                      <a:latin typeface="Cambria Math" panose="02040503050406030204" pitchFamily="18" charset="0"/>
+                                    </a:rPr>
+                                  </m:ctrlPr>
+                                </m:naryPr>
+                                <m:sub>
+                                  <m:r>
+                                    <a:rPr lang="en-US" sz="1800" b="0" i="1" smtClean="0">
+                                      <a:latin typeface="Cambria Math" panose="02040503050406030204" pitchFamily="18" charset="0"/>
+                                    </a:rPr>
+                                    <m:t>𝑦</m:t>
+                                  </m:r>
+                                  <m:r>
+                                    <a:rPr lang="en-US" sz="1800" b="0" i="1" smtClean="0">
+                                      <a:latin typeface="Cambria Math" panose="02040503050406030204" pitchFamily="18" charset="0"/>
+                                    </a:rPr>
+                                    <m:t>∈</m:t>
+                                  </m:r>
+                                  <m:sSub>
+                                    <m:sSubPr>
+                                      <m:ctrlPr>
+                                        <a:rPr lang="en-US" sz="1800" b="0" i="1" smtClean="0">
+                                          <a:latin typeface="Cambria Math" panose="02040503050406030204" pitchFamily="18" charset="0"/>
+                                        </a:rPr>
+                                      </m:ctrlPr>
+                                    </m:sSubPr>
+                                    <m:e>
+                                      <m:r>
+                                        <a:rPr lang="en-US" sz="1800" b="0" i="1" smtClean="0">
+                                          <a:latin typeface="Cambria Math" panose="02040503050406030204" pitchFamily="18" charset="0"/>
+                                        </a:rPr>
+                                        <m:t>𝑁</m:t>
+                                      </m:r>
+                                    </m:e>
+                                    <m:sub>
+                                      <m:r>
+                                        <a:rPr lang="en-US" sz="1800" b="0" i="1" smtClean="0">
+                                          <a:latin typeface="Cambria Math" panose="02040503050406030204" pitchFamily="18" charset="0"/>
+                                        </a:rPr>
+                                        <m:t>𝑘</m:t>
+                                      </m:r>
+                                    </m:sub>
+                                  </m:sSub>
+                                  <m:d>
+                                    <m:dPr>
+                                      <m:ctrlPr>
+                                        <a:rPr lang="en-US" sz="1800" b="0" i="1" smtClean="0">
+                                          <a:latin typeface="Cambria Math" panose="02040503050406030204" pitchFamily="18" charset="0"/>
+                                        </a:rPr>
+                                      </m:ctrlPr>
+                                    </m:dPr>
+                                    <m:e>
+                                      <m:r>
+                                        <a:rPr lang="en-US" sz="1800" b="0" i="1" smtClean="0">
+                                          <a:latin typeface="Cambria Math" panose="02040503050406030204" pitchFamily="18" charset="0"/>
+                                        </a:rPr>
+                                        <m:t>𝑥</m:t>
+                                      </m:r>
+                                    </m:e>
+                                  </m:d>
+                                </m:sub>
+                                <m:sup/>
+                                <m:e>
+                                  <m:f>
+                                    <m:fPr>
+                                      <m:ctrlPr>
+                                        <a:rPr lang="en-US" sz="1800" b="0" i="1" smtClean="0">
+                                          <a:latin typeface="Cambria Math" panose="02040503050406030204" pitchFamily="18" charset="0"/>
+                                        </a:rPr>
+                                      </m:ctrlPr>
+                                    </m:fPr>
+                                    <m:num>
+                                      <m:sSub>
+                                        <m:sSubPr>
+                                          <m:ctrlPr>
+                                            <a:rPr lang="en-US" sz="1800" i="1">
+                                              <a:latin typeface="Cambria Math" panose="02040503050406030204" pitchFamily="18" charset="0"/>
+                                            </a:rPr>
+                                          </m:ctrlPr>
+                                        </m:sSubPr>
+                                        <m:e>
+                                          <m:r>
+                                            <m:rPr>
+                                              <m:nor/>
+                                            </m:rPr>
+                                            <a:rPr lang="en-US" sz="1800">
+                                              <a:latin typeface="Cambria Math" panose="02040503050406030204" pitchFamily="18" charset="0"/>
+                                            </a:rPr>
+                                            <m:t>reachability</m:t>
+                                          </m:r>
+                                          <m:r>
+                                            <m:rPr>
+                                              <m:nor/>
+                                            </m:rPr>
+                                            <a:rPr lang="en-US" sz="1800" i="0">
+                                              <a:latin typeface="Cambria Math" panose="02040503050406030204" pitchFamily="18" charset="0"/>
+                                            </a:rPr>
+                                            <m:t>-</m:t>
+                                          </m:r>
+                                          <m:r>
+                                            <m:rPr>
+                                              <m:nor/>
+                                            </m:rPr>
+                                            <a:rPr lang="en-US" sz="1800">
+                                              <a:latin typeface="Cambria Math" panose="02040503050406030204" pitchFamily="18" charset="0"/>
+                                            </a:rPr>
+                                            <m:t>distance</m:t>
+                                          </m:r>
+                                        </m:e>
+                                        <m:sub>
+                                          <m:r>
+                                            <a:rPr lang="en-US" sz="1800" i="1">
+                                              <a:latin typeface="Cambria Math" panose="02040503050406030204" pitchFamily="18" charset="0"/>
+                                            </a:rPr>
+                                            <m:t>𝑘</m:t>
+                                          </m:r>
+                                        </m:sub>
+                                      </m:sSub>
+                                      <m:d>
+                                        <m:dPr>
+                                          <m:ctrlPr>
+                                            <a:rPr lang="en-US" sz="1800" i="1">
+                                              <a:latin typeface="Cambria Math" panose="02040503050406030204" pitchFamily="18" charset="0"/>
+                                            </a:rPr>
+                                          </m:ctrlPr>
+                                        </m:dPr>
+                                        <m:e>
+                                          <m:r>
+                                            <a:rPr lang="en-US" sz="1800" i="1">
+                                              <a:latin typeface="Cambria Math" panose="02040503050406030204" pitchFamily="18" charset="0"/>
+                                            </a:rPr>
+                                            <m:t>𝑥</m:t>
+                                          </m:r>
+                                          <m:r>
+                                            <a:rPr lang="en-US" sz="1800" i="1">
+                                              <a:latin typeface="Cambria Math" panose="02040503050406030204" pitchFamily="18" charset="0"/>
+                                            </a:rPr>
+                                            <m:t>,</m:t>
+                                          </m:r>
+                                          <m:r>
+                                            <a:rPr lang="en-US" sz="1800" i="1">
+                                              <a:latin typeface="Cambria Math" panose="02040503050406030204" pitchFamily="18" charset="0"/>
+                                            </a:rPr>
+                                            <m:t>𝑦</m:t>
+                                          </m:r>
+                                        </m:e>
+                                      </m:d>
+                                    </m:num>
+                                    <m:den>
+                                      <m:d>
+                                        <m:dPr>
+                                          <m:begChr m:val="|"/>
+                                          <m:endChr m:val="|"/>
+                                          <m:ctrlPr>
+                                            <a:rPr lang="en-US" sz="1800" b="0" i="1" smtClean="0">
+                                              <a:latin typeface="Cambria Math" panose="02040503050406030204" pitchFamily="18" charset="0"/>
+                                            </a:rPr>
+                                          </m:ctrlPr>
+                                        </m:dPr>
+                                        <m:e>
+                                          <m:sSub>
+                                            <m:sSubPr>
+                                              <m:ctrlPr>
+                                                <a:rPr lang="en-US" sz="1800" b="0" i="1" smtClean="0">
+                                                  <a:latin typeface="Cambria Math" panose="02040503050406030204" pitchFamily="18" charset="0"/>
+                                                </a:rPr>
+                                              </m:ctrlPr>
+                                            </m:sSubPr>
+                                            <m:e>
+                                              <m:r>
+                                                <a:rPr lang="en-US" sz="1800" b="0" i="1" smtClean="0">
+                                                  <a:latin typeface="Cambria Math" panose="02040503050406030204" pitchFamily="18" charset="0"/>
+                                                </a:rPr>
+                                                <m:t>𝑁</m:t>
+                                              </m:r>
+                                            </m:e>
+                                            <m:sub>
+                                              <m:r>
+                                                <a:rPr lang="en-US" sz="1800" b="0" i="1" smtClean="0">
+                                                  <a:latin typeface="Cambria Math" panose="02040503050406030204" pitchFamily="18" charset="0"/>
+                                                </a:rPr>
+                                                <m:t>𝑘</m:t>
+                                              </m:r>
+                                            </m:sub>
+                                          </m:sSub>
+                                          <m:d>
+                                            <m:dPr>
+                                              <m:ctrlPr>
+                                                <a:rPr lang="en-US" sz="1800" b="0" i="1" smtClean="0">
+                                                  <a:latin typeface="Cambria Math" panose="02040503050406030204" pitchFamily="18" charset="0"/>
+                                                </a:rPr>
+                                              </m:ctrlPr>
+                                            </m:dPr>
+                                            <m:e>
+                                              <m:r>
+                                                <a:rPr lang="en-US" sz="1800" b="0" i="1" smtClean="0">
+                                                  <a:latin typeface="Cambria Math" panose="02040503050406030204" pitchFamily="18" charset="0"/>
+                                                </a:rPr>
+                                                <m:t>𝑥</m:t>
+                                              </m:r>
+                                            </m:e>
+                                          </m:d>
+                                        </m:e>
+                                      </m:d>
+                                    </m:den>
+                                  </m:f>
+                                </m:e>
+                              </m:nary>
+                            </m:e>
+                          </m:d>
+                        </m:e>
+                        <m:sup>
+                          <m:r>
+                            <a:rPr lang="en-US" sz="1800" b="0" i="1" smtClean="0">
+                              <a:latin typeface="Cambria Math" panose="02040503050406030204" pitchFamily="18" charset="0"/>
+                            </a:rPr>
+                            <m:t>−1</m:t>
+                          </m:r>
+                        </m:sup>
+                      </m:sSup>
+                    </m:oMath>
+                  </m:oMathPara>
+                </a14:m>
+                <a:endParaRPr lang="en-US" sz="1800" dirty="0"/>
+              </a:p>
+              <a:p>
+                <a:r>
+                  <a:rPr lang="en-US" sz="1800" dirty="0"/>
+                  <a:t>The </a:t>
+                </a:r>
+                <a:r>
+                  <a:rPr lang="en-US" sz="1800" b="1" dirty="0"/>
+                  <a:t>local outlier factor</a:t>
+                </a:r>
+                <a:r>
+                  <a:rPr lang="en-US" sz="1800" dirty="0"/>
+                  <a:t> is given by:</a:t>
+                </a:r>
+              </a:p>
+              <a:p>
+                <a:pPr marL="0" indent="0">
+                  <a:buNone/>
+                </a:pPr>
+                <a14:m>
+                  <m:oMathPara xmlns:m="http://schemas.openxmlformats.org/officeDocument/2006/math">
+                    <m:oMathParaPr>
+                      <m:jc m:val="centerGroup"/>
+                    </m:oMathParaPr>
+                    <m:oMath xmlns:m="http://schemas.openxmlformats.org/officeDocument/2006/math">
+                      <m:sSub>
+                        <m:sSubPr>
+                          <m:ctrlPr>
+                            <a:rPr lang="en-US" sz="1800" b="0" i="1" smtClean="0">
+                              <a:latin typeface="Cambria Math" panose="02040503050406030204" pitchFamily="18" charset="0"/>
+                            </a:rPr>
+                          </m:ctrlPr>
+                        </m:sSubPr>
+                        <m:e>
+                          <m:r>
+                            <m:rPr>
+                              <m:nor/>
+                            </m:rPr>
+                            <a:rPr lang="en-US" sz="1800" b="0" i="0" smtClean="0">
+                              <a:latin typeface="Cambria Math" panose="02040503050406030204" pitchFamily="18" charset="0"/>
+                            </a:rPr>
+                            <m:t>LOF</m:t>
+                          </m:r>
+                        </m:e>
+                        <m:sub>
+                          <m:r>
+                            <a:rPr lang="en-US" sz="1800" b="0" i="1" smtClean="0">
+                              <a:latin typeface="Cambria Math" panose="02040503050406030204" pitchFamily="18" charset="0"/>
+                            </a:rPr>
+                            <m:t>𝑘</m:t>
+                          </m:r>
+                        </m:sub>
+                      </m:sSub>
+                      <m:d>
+                        <m:dPr>
+                          <m:ctrlPr>
+                            <a:rPr lang="en-US" sz="1800" b="0" i="1" smtClean="0">
+                              <a:latin typeface="Cambria Math" panose="02040503050406030204" pitchFamily="18" charset="0"/>
+                            </a:rPr>
+                          </m:ctrlPr>
+                        </m:dPr>
+                        <m:e>
+                          <m:r>
+                            <a:rPr lang="en-US" sz="1800" b="0" i="1" smtClean="0">
+                              <a:latin typeface="Cambria Math" panose="02040503050406030204" pitchFamily="18" charset="0"/>
+                            </a:rPr>
+                            <m:t>𝑥</m:t>
+                          </m:r>
+                        </m:e>
+                      </m:d>
+                      <m:r>
+                        <a:rPr lang="en-US" sz="1800" b="0" i="1" smtClean="0">
+                          <a:latin typeface="Cambria Math" panose="02040503050406030204" pitchFamily="18" charset="0"/>
+                        </a:rPr>
+                        <m:t>=</m:t>
+                      </m:r>
+                      <m:f>
+                        <m:fPr>
+                          <m:ctrlPr>
+                            <a:rPr lang="en-US" sz="1800" b="0" i="1" smtClean="0">
+                              <a:latin typeface="Cambria Math" panose="02040503050406030204" pitchFamily="18" charset="0"/>
+                            </a:rPr>
+                          </m:ctrlPr>
+                        </m:fPr>
+                        <m:num>
+                          <m:nary>
+                            <m:naryPr>
+                              <m:chr m:val="∑"/>
+                              <m:supHide m:val="on"/>
+                              <m:ctrlPr>
+                                <a:rPr lang="en-US" sz="1800" b="0" i="1" smtClean="0">
+                                  <a:latin typeface="Cambria Math" panose="02040503050406030204" pitchFamily="18" charset="0"/>
+                                </a:rPr>
+                              </m:ctrlPr>
+                            </m:naryPr>
+                            <m:sub>
+                              <m:r>
+                                <a:rPr lang="en-US" sz="1800" b="0" i="1" smtClean="0">
+                                  <a:latin typeface="Cambria Math" panose="02040503050406030204" pitchFamily="18" charset="0"/>
+                                </a:rPr>
+                                <m:t>𝑦</m:t>
+                              </m:r>
+                              <m:r>
+                                <a:rPr lang="en-US" sz="1800" b="0" i="1" smtClean="0">
+                                  <a:latin typeface="Cambria Math" panose="02040503050406030204" pitchFamily="18" charset="0"/>
+                                </a:rPr>
+                                <m:t>∈</m:t>
+                              </m:r>
+                              <m:sSub>
+                                <m:sSubPr>
+                                  <m:ctrlPr>
+                                    <a:rPr lang="en-US" sz="1800" b="0" i="1" smtClean="0">
+                                      <a:latin typeface="Cambria Math" panose="02040503050406030204" pitchFamily="18" charset="0"/>
+                                    </a:rPr>
+                                  </m:ctrlPr>
+                                </m:sSubPr>
+                                <m:e>
+                                  <m:r>
+                                    <a:rPr lang="en-US" sz="1800" b="0" i="1" smtClean="0">
+                                      <a:latin typeface="Cambria Math" panose="02040503050406030204" pitchFamily="18" charset="0"/>
+                                    </a:rPr>
+                                    <m:t>𝑁</m:t>
+                                  </m:r>
+                                </m:e>
+                                <m:sub>
+                                  <m:r>
+                                    <a:rPr lang="en-US" sz="1800" b="0" i="1" smtClean="0">
+                                      <a:latin typeface="Cambria Math" panose="02040503050406030204" pitchFamily="18" charset="0"/>
+                                    </a:rPr>
+                                    <m:t>𝑘</m:t>
+                                  </m:r>
+                                </m:sub>
+                              </m:sSub>
+                              <m:d>
+                                <m:dPr>
+                                  <m:ctrlPr>
+                                    <a:rPr lang="en-US" sz="1800" b="0" i="1" smtClean="0">
+                                      <a:latin typeface="Cambria Math" panose="02040503050406030204" pitchFamily="18" charset="0"/>
+                                    </a:rPr>
+                                  </m:ctrlPr>
+                                </m:dPr>
+                                <m:e>
+                                  <m:r>
+                                    <a:rPr lang="en-US" sz="1800" b="0" i="1" smtClean="0">
+                                      <a:latin typeface="Cambria Math" panose="02040503050406030204" pitchFamily="18" charset="0"/>
+                                    </a:rPr>
+                                    <m:t>𝑥</m:t>
+                                  </m:r>
+                                </m:e>
+                              </m:d>
+                            </m:sub>
+                            <m:sup/>
+                            <m:e>
+                              <m:f>
+                                <m:fPr>
+                                  <m:ctrlPr>
+                                    <a:rPr lang="en-US" sz="1800" b="0" i="1" smtClean="0">
+                                      <a:latin typeface="Cambria Math" panose="02040503050406030204" pitchFamily="18" charset="0"/>
+                                    </a:rPr>
+                                  </m:ctrlPr>
+                                </m:fPr>
+                                <m:num>
+                                  <m:sSub>
+                                    <m:sSubPr>
+                                      <m:ctrlPr>
+                                        <a:rPr lang="en-US" sz="1800" b="0" i="1" smtClean="0">
+                                          <a:latin typeface="Cambria Math" panose="02040503050406030204" pitchFamily="18" charset="0"/>
+                                        </a:rPr>
+                                      </m:ctrlPr>
+                                    </m:sSubPr>
+                                    <m:e>
+                                      <m:r>
+                                        <m:rPr>
+                                          <m:nor/>
+                                        </m:rPr>
+                                        <a:rPr lang="en-US" sz="1800">
+                                          <a:latin typeface="Cambria Math" panose="02040503050406030204" pitchFamily="18" charset="0"/>
+                                        </a:rPr>
+                                        <m:t>lrd</m:t>
+                                      </m:r>
+                                    </m:e>
+                                    <m:sub>
+                                      <m:r>
+                                        <a:rPr lang="en-US" sz="1800" b="0" i="1" smtClean="0">
+                                          <a:latin typeface="Cambria Math" panose="02040503050406030204" pitchFamily="18" charset="0"/>
+                                        </a:rPr>
+                                        <m:t>𝑘</m:t>
+                                      </m:r>
+                                    </m:sub>
+                                  </m:sSub>
+                                  <m:d>
+                                    <m:dPr>
+                                      <m:ctrlPr>
+                                        <a:rPr lang="en-US" sz="1800" b="0" i="1" smtClean="0">
+                                          <a:latin typeface="Cambria Math" panose="02040503050406030204" pitchFamily="18" charset="0"/>
+                                        </a:rPr>
+                                      </m:ctrlPr>
+                                    </m:dPr>
+                                    <m:e>
+                                      <m:r>
+                                        <a:rPr lang="en-US" sz="1800" b="0" i="1" smtClean="0">
+                                          <a:latin typeface="Cambria Math" panose="02040503050406030204" pitchFamily="18" charset="0"/>
+                                        </a:rPr>
+                                        <m:t>𝑦</m:t>
+                                      </m:r>
+                                    </m:e>
+                                  </m:d>
+                                </m:num>
+                                <m:den>
+                                  <m:sSub>
+                                    <m:sSubPr>
+                                      <m:ctrlPr>
+                                        <a:rPr lang="en-US" sz="1800" b="0" i="1" smtClean="0">
+                                          <a:latin typeface="Cambria Math" panose="02040503050406030204" pitchFamily="18" charset="0"/>
+                                        </a:rPr>
+                                      </m:ctrlPr>
+                                    </m:sSubPr>
+                                    <m:e>
+                                      <m:r>
+                                        <m:rPr>
+                                          <m:nor/>
+                                        </m:rPr>
+                                        <a:rPr lang="en-US" sz="1800">
+                                          <a:latin typeface="Cambria Math" panose="02040503050406030204" pitchFamily="18" charset="0"/>
+                                        </a:rPr>
+                                        <m:t>lrd</m:t>
+                                      </m:r>
+                                    </m:e>
+                                    <m:sub>
+                                      <m:r>
+                                        <a:rPr lang="en-US" sz="1800" b="0" i="1" smtClean="0">
+                                          <a:latin typeface="Cambria Math" panose="02040503050406030204" pitchFamily="18" charset="0"/>
+                                        </a:rPr>
+                                        <m:t>𝑘</m:t>
+                                      </m:r>
+                                    </m:sub>
+                                  </m:sSub>
+                                  <m:d>
+                                    <m:dPr>
+                                      <m:ctrlPr>
+                                        <a:rPr lang="en-US" sz="1800" b="0" i="1" smtClean="0">
+                                          <a:latin typeface="Cambria Math" panose="02040503050406030204" pitchFamily="18" charset="0"/>
+                                        </a:rPr>
+                                      </m:ctrlPr>
+                                    </m:dPr>
+                                    <m:e>
+                                      <m:r>
+                                        <a:rPr lang="en-US" sz="1800" b="0" i="1" smtClean="0">
+                                          <a:latin typeface="Cambria Math" panose="02040503050406030204" pitchFamily="18" charset="0"/>
+                                        </a:rPr>
+                                        <m:t>𝑥</m:t>
+                                      </m:r>
+                                    </m:e>
+                                  </m:d>
+                                </m:den>
+                              </m:f>
+                            </m:e>
+                          </m:nary>
+                        </m:num>
+                        <m:den>
+                          <m:d>
+                            <m:dPr>
+                              <m:begChr m:val="|"/>
+                              <m:endChr m:val="|"/>
+                              <m:ctrlPr>
+                                <a:rPr lang="en-US" sz="1800" b="0" i="1" smtClean="0">
+                                  <a:latin typeface="Cambria Math" panose="02040503050406030204" pitchFamily="18" charset="0"/>
+                                </a:rPr>
+                              </m:ctrlPr>
+                            </m:dPr>
+                            <m:e>
+                              <m:sSub>
+                                <m:sSubPr>
+                                  <m:ctrlPr>
+                                    <a:rPr lang="en-US" sz="1800" b="0" i="1" smtClean="0">
+                                      <a:latin typeface="Cambria Math" panose="02040503050406030204" pitchFamily="18" charset="0"/>
+                                    </a:rPr>
+                                  </m:ctrlPr>
+                                </m:sSubPr>
+                                <m:e>
+                                  <m:r>
+                                    <a:rPr lang="en-US" sz="1800" b="0" i="1" smtClean="0">
+                                      <a:latin typeface="Cambria Math" panose="02040503050406030204" pitchFamily="18" charset="0"/>
+                                    </a:rPr>
+                                    <m:t>𝑁</m:t>
+                                  </m:r>
+                                </m:e>
+                                <m:sub>
+                                  <m:r>
+                                    <a:rPr lang="en-US" sz="1800" b="0" i="1" smtClean="0">
+                                      <a:latin typeface="Cambria Math" panose="02040503050406030204" pitchFamily="18" charset="0"/>
+                                    </a:rPr>
+                                    <m:t>𝑘</m:t>
+                                  </m:r>
+                                </m:sub>
+                              </m:sSub>
+                              <m:d>
+                                <m:dPr>
+                                  <m:ctrlPr>
+                                    <a:rPr lang="en-US" sz="1800" b="0" i="1" smtClean="0">
+                                      <a:latin typeface="Cambria Math" panose="02040503050406030204" pitchFamily="18" charset="0"/>
+                                    </a:rPr>
+                                  </m:ctrlPr>
+                                </m:dPr>
+                                <m:e>
+                                  <m:r>
+                                    <a:rPr lang="en-US" sz="1800" b="0" i="1" smtClean="0">
+                                      <a:latin typeface="Cambria Math" panose="02040503050406030204" pitchFamily="18" charset="0"/>
+                                    </a:rPr>
+                                    <m:t>𝑥</m:t>
+                                  </m:r>
+                                </m:e>
+                              </m:d>
+                            </m:e>
+                          </m:d>
+                        </m:den>
+                      </m:f>
+                      <m:r>
+                        <a:rPr lang="en-US" sz="1800" b="0" i="1" smtClean="0">
+                          <a:latin typeface="Cambria Math" panose="02040503050406030204" pitchFamily="18" charset="0"/>
+                        </a:rPr>
+                        <m:t>=</m:t>
+                      </m:r>
+                      <m:f>
+                        <m:fPr>
+                          <m:ctrlPr>
+                            <a:rPr lang="en-US" sz="1800" i="1">
+                              <a:latin typeface="Cambria Math" panose="02040503050406030204" pitchFamily="18" charset="0"/>
+                            </a:rPr>
+                          </m:ctrlPr>
+                        </m:fPr>
+                        <m:num>
+                          <m:nary>
+                            <m:naryPr>
+                              <m:chr m:val="∑"/>
+                              <m:supHide m:val="on"/>
+                              <m:ctrlPr>
+                                <a:rPr lang="en-US" sz="1800" i="1">
+                                  <a:latin typeface="Cambria Math" panose="02040503050406030204" pitchFamily="18" charset="0"/>
+                                </a:rPr>
+                              </m:ctrlPr>
+                            </m:naryPr>
+                            <m:sub>
+                              <m:r>
+                                <a:rPr lang="en-US" sz="1800" i="1">
+                                  <a:latin typeface="Cambria Math" panose="02040503050406030204" pitchFamily="18" charset="0"/>
+                                </a:rPr>
+                                <m:t>𝑦</m:t>
+                              </m:r>
+                              <m:r>
+                                <a:rPr lang="en-US" sz="1800" i="1">
+                                  <a:latin typeface="Cambria Math" panose="02040503050406030204" pitchFamily="18" charset="0"/>
+                                </a:rPr>
+                                <m:t>∈</m:t>
+                              </m:r>
+                              <m:sSub>
+                                <m:sSubPr>
+                                  <m:ctrlPr>
+                                    <a:rPr lang="en-US" sz="1800" i="1">
+                                      <a:latin typeface="Cambria Math" panose="02040503050406030204" pitchFamily="18" charset="0"/>
+                                    </a:rPr>
+                                  </m:ctrlPr>
+                                </m:sSubPr>
+                                <m:e>
+                                  <m:r>
+                                    <a:rPr lang="en-US" sz="1800" i="1">
+                                      <a:latin typeface="Cambria Math" panose="02040503050406030204" pitchFamily="18" charset="0"/>
+                                    </a:rPr>
+                                    <m:t>𝑁</m:t>
+                                  </m:r>
+                                </m:e>
+                                <m:sub>
+                                  <m:r>
+                                    <a:rPr lang="en-US" sz="1800" i="1">
+                                      <a:latin typeface="Cambria Math" panose="02040503050406030204" pitchFamily="18" charset="0"/>
+                                    </a:rPr>
+                                    <m:t>𝑘</m:t>
+                                  </m:r>
+                                </m:sub>
+                              </m:sSub>
+                              <m:d>
+                                <m:dPr>
+                                  <m:ctrlPr>
+                                    <a:rPr lang="en-US" sz="1800" i="1">
+                                      <a:latin typeface="Cambria Math" panose="02040503050406030204" pitchFamily="18" charset="0"/>
+                                    </a:rPr>
+                                  </m:ctrlPr>
+                                </m:dPr>
+                                <m:e>
+                                  <m:r>
+                                    <a:rPr lang="en-US" sz="1800" i="1">
+                                      <a:latin typeface="Cambria Math" panose="02040503050406030204" pitchFamily="18" charset="0"/>
+                                    </a:rPr>
+                                    <m:t>𝑥</m:t>
+                                  </m:r>
+                                </m:e>
+                              </m:d>
+                            </m:sub>
+                            <m:sup/>
+                            <m:e>
+                              <m:sSub>
+                                <m:sSubPr>
+                                  <m:ctrlPr>
+                                    <a:rPr lang="en-US" sz="1800" i="1">
+                                      <a:latin typeface="Cambria Math" panose="02040503050406030204" pitchFamily="18" charset="0"/>
+                                    </a:rPr>
+                                  </m:ctrlPr>
+                                </m:sSubPr>
+                                <m:e>
+                                  <m:r>
+                                    <m:rPr>
+                                      <m:nor/>
+                                    </m:rPr>
+                                    <a:rPr lang="en-US" sz="1800">
+                                      <a:latin typeface="Cambria Math" panose="02040503050406030204" pitchFamily="18" charset="0"/>
+                                    </a:rPr>
+                                    <m:t>lrd</m:t>
+                                  </m:r>
+                                </m:e>
+                                <m:sub>
+                                  <m:r>
+                                    <a:rPr lang="en-US" sz="1800" i="1">
+                                      <a:latin typeface="Cambria Math" panose="02040503050406030204" pitchFamily="18" charset="0"/>
+                                    </a:rPr>
+                                    <m:t>𝑘</m:t>
+                                  </m:r>
+                                </m:sub>
+                              </m:sSub>
+                              <m:d>
+                                <m:dPr>
+                                  <m:ctrlPr>
+                                    <a:rPr lang="en-US" sz="1800" i="1">
+                                      <a:latin typeface="Cambria Math" panose="02040503050406030204" pitchFamily="18" charset="0"/>
+                                    </a:rPr>
+                                  </m:ctrlPr>
+                                </m:dPr>
+                                <m:e>
+                                  <m:r>
+                                    <a:rPr lang="en-US" sz="1800" i="1">
+                                      <a:latin typeface="Cambria Math" panose="02040503050406030204" pitchFamily="18" charset="0"/>
+                                    </a:rPr>
+                                    <m:t>𝑦</m:t>
+                                  </m:r>
+                                </m:e>
+                              </m:d>
+                            </m:e>
+                          </m:nary>
+                        </m:num>
+                        <m:den>
+                          <m:d>
+                            <m:dPr>
+                              <m:begChr m:val="|"/>
+                              <m:endChr m:val="|"/>
+                              <m:ctrlPr>
+                                <a:rPr lang="en-US" sz="1800" i="1">
+                                  <a:latin typeface="Cambria Math" panose="02040503050406030204" pitchFamily="18" charset="0"/>
+                                </a:rPr>
+                              </m:ctrlPr>
+                            </m:dPr>
+                            <m:e>
+                              <m:sSub>
+                                <m:sSubPr>
+                                  <m:ctrlPr>
+                                    <a:rPr lang="en-US" sz="1800" i="1">
+                                      <a:latin typeface="Cambria Math" panose="02040503050406030204" pitchFamily="18" charset="0"/>
+                                    </a:rPr>
+                                  </m:ctrlPr>
+                                </m:sSubPr>
+                                <m:e>
+                                  <m:r>
+                                    <a:rPr lang="en-US" sz="1800" i="1">
+                                      <a:latin typeface="Cambria Math" panose="02040503050406030204" pitchFamily="18" charset="0"/>
+                                    </a:rPr>
+                                    <m:t>𝑁</m:t>
+                                  </m:r>
+                                </m:e>
+                                <m:sub>
+                                  <m:r>
+                                    <a:rPr lang="en-US" sz="1800" i="1">
+                                      <a:latin typeface="Cambria Math" panose="02040503050406030204" pitchFamily="18" charset="0"/>
+                                    </a:rPr>
+                                    <m:t>𝑘</m:t>
+                                  </m:r>
+                                </m:sub>
+                              </m:sSub>
+                              <m:d>
+                                <m:dPr>
+                                  <m:ctrlPr>
+                                    <a:rPr lang="en-US" sz="1800" i="1">
+                                      <a:latin typeface="Cambria Math" panose="02040503050406030204" pitchFamily="18" charset="0"/>
+                                    </a:rPr>
+                                  </m:ctrlPr>
+                                </m:dPr>
+                                <m:e>
+                                  <m:r>
+                                    <a:rPr lang="en-US" sz="1800" i="1">
+                                      <a:latin typeface="Cambria Math" panose="02040503050406030204" pitchFamily="18" charset="0"/>
+                                    </a:rPr>
+                                    <m:t>𝑥</m:t>
+                                  </m:r>
+                                </m:e>
+                              </m:d>
+                            </m:e>
+                          </m:d>
+                          <m:r>
+                            <a:rPr lang="en-US" sz="1800" b="0" i="1" smtClean="0">
+                              <a:latin typeface="Cambria Math" panose="02040503050406030204" pitchFamily="18" charset="0"/>
+                            </a:rPr>
+                            <m:t>⋅</m:t>
+                          </m:r>
+                          <m:sSub>
+                            <m:sSubPr>
+                              <m:ctrlPr>
+                                <a:rPr lang="en-US" sz="1800" i="1">
+                                  <a:latin typeface="Cambria Math" panose="02040503050406030204" pitchFamily="18" charset="0"/>
+                                </a:rPr>
+                              </m:ctrlPr>
+                            </m:sSubPr>
+                            <m:e>
+                              <m:r>
+                                <m:rPr>
+                                  <m:nor/>
+                                </m:rPr>
+                                <a:rPr lang="en-US" sz="1800">
+                                  <a:latin typeface="Cambria Math" panose="02040503050406030204" pitchFamily="18" charset="0"/>
+                                </a:rPr>
+                                <m:t>lrd</m:t>
+                              </m:r>
+                            </m:e>
+                            <m:sub>
+                              <m:r>
+                                <a:rPr lang="en-US" sz="1800" i="1">
+                                  <a:latin typeface="Cambria Math" panose="02040503050406030204" pitchFamily="18" charset="0"/>
+                                </a:rPr>
+                                <m:t>𝑘</m:t>
+                              </m:r>
+                            </m:sub>
+                          </m:sSub>
+                          <m:d>
+                            <m:dPr>
+                              <m:ctrlPr>
+                                <a:rPr lang="en-US" sz="1800" i="1">
+                                  <a:latin typeface="Cambria Math" panose="02040503050406030204" pitchFamily="18" charset="0"/>
+                                </a:rPr>
+                              </m:ctrlPr>
+                            </m:dPr>
+                            <m:e>
+                              <m:r>
+                                <a:rPr lang="en-US" sz="1800" b="0" i="1" smtClean="0">
+                                  <a:latin typeface="Cambria Math" panose="02040503050406030204" pitchFamily="18" charset="0"/>
+                                </a:rPr>
+                                <m:t>𝑥</m:t>
+                              </m:r>
+                            </m:e>
+                          </m:d>
+                        </m:den>
+                      </m:f>
+                    </m:oMath>
+                  </m:oMathPara>
+                </a14:m>
+                <a:endParaRPr lang="en-IL" sz="1800" dirty="0"/>
+              </a:p>
+            </p:txBody>
+          </p:sp>
+        </mc:Choice>
+        <mc:Fallback>
+          <p:sp>
+            <p:nvSpPr>
+              <p:cNvPr id="3" name="Content Placeholder 2">
+                <a:extLst>
+                  <a:ext uri="{FF2B5EF4-FFF2-40B4-BE49-F238E27FC236}">
+                    <a16:creationId xmlns:a16="http://schemas.microsoft.com/office/drawing/2014/main" id="{3BEC0D32-E596-4419-AC28-135573C194E4}"/>
+                  </a:ext>
+                </a:extLst>
+              </p:cNvPr>
+              <p:cNvSpPr>
+                <a:spLocks noGrp="1" noRot="1" noChangeAspect="1" noMove="1" noResize="1" noEditPoints="1" noAdjustHandles="1" noChangeArrowheads="1" noChangeShapeType="1" noTextEdit="1"/>
+              </p:cNvSpPr>
+              <p:nvPr>
+                <p:ph idx="1"/>
+              </p:nvPr>
+            </p:nvSpPr>
+            <p:spPr>
+              <a:blipFill>
+                <a:blip r:embed="rId3"/>
+                <a:stretch>
+                  <a:fillRect l="-121" t="-752"/>
+                </a:stretch>
+              </a:blipFill>
+            </p:spPr>
+            <p:txBody>
+              <a:bodyPr/>
+              <a:lstStyle/>
+              <a:p>
+                <a:r>
+                  <a:rPr lang="en-IL">
+                    <a:noFill/>
+                  </a:rPr>
+                  <a:t> </a:t>
+                </a:r>
+              </a:p>
+            </p:txBody>
+          </p:sp>
+        </mc:Fallback>
+      </mc:AlternateContent>
+      <p:sp>
+        <p:nvSpPr>
+          <p:cNvPr id="4" name="Footer Placeholder 3">
+            <a:extLst>
+              <a:ext uri="{FF2B5EF4-FFF2-40B4-BE49-F238E27FC236}">
+                <a16:creationId xmlns:a16="http://schemas.microsoft.com/office/drawing/2014/main" id="{CAAA0805-FE77-43B5-A4DF-97801DDB20CF}"/>
+              </a:ext>
+            </a:extLst>
+          </p:cNvPr>
+          <p:cNvSpPr>
+            <a:spLocks noGrp="1"/>
+          </p:cNvSpPr>
+          <p:nvPr>
+            <p:ph type="ftr" sz="quarter" idx="11"/>
+          </p:nvPr>
+        </p:nvSpPr>
+        <p:spPr/>
+        <p:txBody>
+          <a:bodyPr/>
+          <a:lstStyle/>
+          <a:p>
+            <a:r>
+              <a:rPr lang="en-US"/>
+              <a:t>Materials by Adi Sarid https://adisarid.github.io and http://www.sarid-ins.com</a:t>
+            </a:r>
+            <a:endParaRPr lang="en-US" dirty="0"/>
+          </a:p>
+        </p:txBody>
+      </p:sp>
+      <p:sp>
+        <p:nvSpPr>
+          <p:cNvPr id="5" name="Slide Number Placeholder 4">
+            <a:extLst>
+              <a:ext uri="{FF2B5EF4-FFF2-40B4-BE49-F238E27FC236}">
+                <a16:creationId xmlns:a16="http://schemas.microsoft.com/office/drawing/2014/main" id="{9879801F-D052-422C-A936-DCFCAAE133DC}"/>
+              </a:ext>
+            </a:extLst>
+          </p:cNvPr>
+          <p:cNvSpPr>
+            <a:spLocks noGrp="1"/>
+          </p:cNvSpPr>
+          <p:nvPr>
+            <p:ph type="sldNum" sz="quarter" idx="12"/>
+          </p:nvPr>
+        </p:nvSpPr>
+        <p:spPr/>
+        <p:txBody>
+          <a:bodyPr/>
+          <a:lstStyle/>
+          <a:p>
+            <a:fld id="{4FAB73BC-B049-4115-A692-8D63A059BFB8}" type="slidenum">
+              <a:rPr lang="en-US" smtClean="0"/>
+              <a:t>34</a:t>
+            </a:fld>
+            <a:endParaRPr lang="en-US" dirty="0"/>
+          </a:p>
+        </p:txBody>
+      </p:sp>
+      <p:sp>
+        <p:nvSpPr>
+          <p:cNvPr id="6" name="Rectangle: Rounded Corners 5">
+            <a:extLst>
+              <a:ext uri="{FF2B5EF4-FFF2-40B4-BE49-F238E27FC236}">
+                <a16:creationId xmlns:a16="http://schemas.microsoft.com/office/drawing/2014/main" id="{7E911E2D-EA55-4987-9161-96983992BB7C}"/>
+              </a:ext>
+            </a:extLst>
+          </p:cNvPr>
+          <p:cNvSpPr/>
+          <p:nvPr/>
+        </p:nvSpPr>
+        <p:spPr>
+          <a:xfrm>
+            <a:off x="9114183" y="2893454"/>
+            <a:ext cx="2837025" cy="831436"/>
+          </a:xfrm>
+          <a:prstGeom prst="roundRect">
+            <a:avLst/>
+          </a:prstGeom>
+        </p:spPr>
+        <p:style>
+          <a:lnRef idx="2">
+            <a:schemeClr val="accent1">
+              <a:shade val="50000"/>
+            </a:schemeClr>
+          </a:lnRef>
+          <a:fillRef idx="1">
+            <a:schemeClr val="accent1"/>
+          </a:fillRef>
+          <a:effectRef idx="0">
+            <a:schemeClr val="accent1"/>
+          </a:effectRef>
+          <a:fontRef idx="minor">
+            <a:schemeClr val="lt1"/>
+          </a:fontRef>
+        </p:style>
+        <p:txBody>
+          <a:bodyPr rtlCol="0" anchor="ctr"/>
+          <a:lstStyle/>
+          <a:p>
+            <a:pPr algn="ctr"/>
+            <a:r>
+              <a:rPr lang="en-US" sz="1600" dirty="0"/>
+              <a:t>How “hard” it is to reach x from y </a:t>
+            </a:r>
+            <a:br>
+              <a:rPr lang="en-US" sz="1600" dirty="0"/>
+            </a:br>
+            <a:r>
+              <a:rPr lang="en-US" sz="1600" dirty="0"/>
+              <a:t>(not symmetric)</a:t>
+            </a:r>
+            <a:endParaRPr lang="en-IL" sz="1600" dirty="0"/>
+          </a:p>
+        </p:txBody>
+      </p:sp>
+      <p:sp>
+        <p:nvSpPr>
+          <p:cNvPr id="7" name="Rectangle: Rounded Corners 6">
+            <a:extLst>
+              <a:ext uri="{FF2B5EF4-FFF2-40B4-BE49-F238E27FC236}">
+                <a16:creationId xmlns:a16="http://schemas.microsoft.com/office/drawing/2014/main" id="{255434DC-31C7-48D8-91FB-131E68B7A32F}"/>
+              </a:ext>
+            </a:extLst>
+          </p:cNvPr>
+          <p:cNvSpPr/>
+          <p:nvPr/>
+        </p:nvSpPr>
+        <p:spPr>
+          <a:xfrm>
+            <a:off x="9114183" y="4081218"/>
+            <a:ext cx="2837025" cy="831436"/>
+          </a:xfrm>
+          <a:prstGeom prst="roundRect">
+            <a:avLst/>
+          </a:prstGeom>
+        </p:spPr>
+        <p:style>
+          <a:lnRef idx="2">
+            <a:schemeClr val="accent1">
+              <a:shade val="50000"/>
+            </a:schemeClr>
+          </a:lnRef>
+          <a:fillRef idx="1">
+            <a:schemeClr val="accent1"/>
+          </a:fillRef>
+          <a:effectRef idx="0">
+            <a:schemeClr val="accent1"/>
+          </a:effectRef>
+          <a:fontRef idx="minor">
+            <a:schemeClr val="lt1"/>
+          </a:fontRef>
+        </p:style>
+        <p:txBody>
+          <a:bodyPr rtlCol="0" anchor="ctr"/>
+          <a:lstStyle/>
+          <a:p>
+            <a:pPr algn="ctr"/>
+            <a:r>
+              <a:rPr lang="en-US" sz="1600" dirty="0"/>
+              <a:t>On average, how “easy” it is to reach x from its neighborhood</a:t>
+            </a:r>
+            <a:endParaRPr lang="en-IL" sz="1600" dirty="0"/>
+          </a:p>
+        </p:txBody>
+      </p:sp>
+      <mc:AlternateContent xmlns:mc="http://schemas.openxmlformats.org/markup-compatibility/2006">
+        <mc:Choice xmlns:a14="http://schemas.microsoft.com/office/drawing/2010/main" Requires="a14">
+          <p:sp>
+            <p:nvSpPr>
+              <p:cNvPr id="8" name="Rectangle: Rounded Corners 7">
+                <a:extLst>
+                  <a:ext uri="{FF2B5EF4-FFF2-40B4-BE49-F238E27FC236}">
+                    <a16:creationId xmlns:a16="http://schemas.microsoft.com/office/drawing/2014/main" id="{6FE2E30A-0E31-4FCE-A7B9-2718E0718217}"/>
+                  </a:ext>
+                </a:extLst>
+              </p:cNvPr>
+              <p:cNvSpPr/>
+              <p:nvPr/>
+            </p:nvSpPr>
+            <p:spPr>
+              <a:xfrm>
+                <a:off x="9114183" y="5261252"/>
+                <a:ext cx="2837025" cy="932020"/>
+              </a:xfrm>
+              <a:prstGeom prst="roundRect">
+                <a:avLst/>
+              </a:prstGeom>
+            </p:spPr>
+            <p:style>
+              <a:lnRef idx="2">
+                <a:schemeClr val="accent1">
+                  <a:shade val="50000"/>
+                </a:schemeClr>
+              </a:lnRef>
+              <a:fillRef idx="1">
+                <a:schemeClr val="accent1"/>
+              </a:fillRef>
+              <a:effectRef idx="0">
+                <a:schemeClr val="accent1"/>
+              </a:effectRef>
+              <a:fontRef idx="minor">
+                <a:schemeClr val="lt1"/>
+              </a:fontRef>
+            </p:style>
+            <p:txBody>
+              <a:bodyPr rtlCol="0" anchor="ctr"/>
+              <a:lstStyle/>
+              <a:p>
+                <a:pPr algn="ctr"/>
+                <a:r>
+                  <a:rPr lang="en-US" sz="1600" dirty="0"/>
+                  <a:t>Large </a:t>
+                </a:r>
+                <a14:m>
+                  <m:oMath xmlns:m="http://schemas.openxmlformats.org/officeDocument/2006/math">
+                    <m:f>
+                      <m:fPr>
+                        <m:ctrlPr>
+                          <a:rPr lang="en-US" sz="1600" i="1">
+                            <a:latin typeface="Cambria Math" panose="02040503050406030204" pitchFamily="18" charset="0"/>
+                          </a:rPr>
+                        </m:ctrlPr>
+                      </m:fPr>
+                      <m:num>
+                        <m:sSub>
+                          <m:sSubPr>
+                            <m:ctrlPr>
+                              <a:rPr lang="en-US" sz="1600" i="1">
+                                <a:latin typeface="Cambria Math" panose="02040503050406030204" pitchFamily="18" charset="0"/>
+                              </a:rPr>
+                            </m:ctrlPr>
+                          </m:sSubPr>
+                          <m:e>
+                            <m:r>
+                              <m:rPr>
+                                <m:nor/>
+                              </m:rPr>
+                              <a:rPr lang="en-US" sz="1600">
+                                <a:latin typeface="Cambria Math" panose="02040503050406030204" pitchFamily="18" charset="0"/>
+                              </a:rPr>
+                              <m:t>lrd</m:t>
+                            </m:r>
+                          </m:e>
+                          <m:sub>
+                            <m:r>
+                              <a:rPr lang="en-US" sz="1600" i="1">
+                                <a:latin typeface="Cambria Math" panose="02040503050406030204" pitchFamily="18" charset="0"/>
+                              </a:rPr>
+                              <m:t>𝑘</m:t>
+                            </m:r>
+                          </m:sub>
+                        </m:sSub>
+                        <m:d>
+                          <m:dPr>
+                            <m:ctrlPr>
+                              <a:rPr lang="en-US" sz="1600" i="1">
+                                <a:latin typeface="Cambria Math" panose="02040503050406030204" pitchFamily="18" charset="0"/>
+                              </a:rPr>
+                            </m:ctrlPr>
+                          </m:dPr>
+                          <m:e>
+                            <m:r>
+                              <a:rPr lang="en-US" sz="1600" i="1">
+                                <a:latin typeface="Cambria Math" panose="02040503050406030204" pitchFamily="18" charset="0"/>
+                              </a:rPr>
+                              <m:t>𝑦</m:t>
+                            </m:r>
+                          </m:e>
+                        </m:d>
+                      </m:num>
+                      <m:den>
+                        <m:sSub>
+                          <m:sSubPr>
+                            <m:ctrlPr>
+                              <a:rPr lang="en-US" sz="1600" i="1">
+                                <a:latin typeface="Cambria Math" panose="02040503050406030204" pitchFamily="18" charset="0"/>
+                              </a:rPr>
+                            </m:ctrlPr>
+                          </m:sSubPr>
+                          <m:e>
+                            <m:r>
+                              <m:rPr>
+                                <m:nor/>
+                              </m:rPr>
+                              <a:rPr lang="en-US" sz="1600">
+                                <a:latin typeface="Cambria Math" panose="02040503050406030204" pitchFamily="18" charset="0"/>
+                              </a:rPr>
+                              <m:t>lrd</m:t>
+                            </m:r>
+                          </m:e>
+                          <m:sub>
+                            <m:r>
+                              <a:rPr lang="en-US" sz="1600" i="1">
+                                <a:latin typeface="Cambria Math" panose="02040503050406030204" pitchFamily="18" charset="0"/>
+                              </a:rPr>
+                              <m:t>𝑘</m:t>
+                            </m:r>
+                          </m:sub>
+                        </m:sSub>
+                        <m:d>
+                          <m:dPr>
+                            <m:ctrlPr>
+                              <a:rPr lang="en-US" sz="1600" i="1">
+                                <a:latin typeface="Cambria Math" panose="02040503050406030204" pitchFamily="18" charset="0"/>
+                              </a:rPr>
+                            </m:ctrlPr>
+                          </m:dPr>
+                          <m:e>
+                            <m:r>
+                              <a:rPr lang="en-US" sz="1600" i="1">
+                                <a:latin typeface="Cambria Math" panose="02040503050406030204" pitchFamily="18" charset="0"/>
+                              </a:rPr>
+                              <m:t>𝑥</m:t>
+                            </m:r>
+                          </m:e>
+                        </m:d>
+                      </m:den>
+                    </m:f>
+                  </m:oMath>
+                </a14:m>
+                <a:r>
+                  <a:rPr lang="en-US" sz="1600" dirty="0"/>
+                  <a:t> means: </a:t>
+                </a:r>
+                <a14:m>
+                  <m:oMath xmlns:m="http://schemas.openxmlformats.org/officeDocument/2006/math">
+                    <m:r>
+                      <a:rPr lang="en-US" sz="1600" i="1" dirty="0" smtClean="0">
+                        <a:latin typeface="Cambria Math" panose="02040503050406030204" pitchFamily="18" charset="0"/>
+                      </a:rPr>
+                      <m:t>𝑦</m:t>
+                    </m:r>
+                  </m:oMath>
+                </a14:m>
+                <a:r>
+                  <a:rPr lang="en-US" sz="1600" dirty="0"/>
+                  <a:t> is easier to reach than </a:t>
+                </a:r>
+                <a14:m>
+                  <m:oMath xmlns:m="http://schemas.openxmlformats.org/officeDocument/2006/math">
+                    <m:r>
+                      <a:rPr lang="en-US" sz="1600" i="1" dirty="0" smtClean="0">
+                        <a:latin typeface="Cambria Math" panose="02040503050406030204" pitchFamily="18" charset="0"/>
+                      </a:rPr>
+                      <m:t>𝑥</m:t>
+                    </m:r>
+                  </m:oMath>
+                </a14:m>
+                <a:r>
+                  <a:rPr lang="en-US" sz="1600" dirty="0"/>
+                  <a:t>, i.e., </a:t>
+                </a:r>
+                <a14:m>
+                  <m:oMath xmlns:m="http://schemas.openxmlformats.org/officeDocument/2006/math">
+                    <m:r>
+                      <a:rPr lang="en-US" sz="1600" b="0" i="1" smtClean="0">
+                        <a:latin typeface="Cambria Math" panose="02040503050406030204" pitchFamily="18" charset="0"/>
+                      </a:rPr>
+                      <m:t>𝑦</m:t>
+                    </m:r>
+                  </m:oMath>
+                </a14:m>
+                <a:r>
+                  <a:rPr lang="en-US" sz="1600" dirty="0"/>
+                  <a:t> is denser than </a:t>
+                </a:r>
+                <a14:m>
+                  <m:oMath xmlns:m="http://schemas.openxmlformats.org/officeDocument/2006/math">
+                    <m:r>
+                      <a:rPr lang="en-US" sz="1600" b="0" i="1" smtClean="0">
+                        <a:latin typeface="Cambria Math" panose="02040503050406030204" pitchFamily="18" charset="0"/>
+                      </a:rPr>
+                      <m:t>𝑥</m:t>
+                    </m:r>
+                  </m:oMath>
+                </a14:m>
+                <a:endParaRPr lang="en-IL" sz="1600" dirty="0"/>
+              </a:p>
+            </p:txBody>
+          </p:sp>
+        </mc:Choice>
+        <mc:Fallback>
+          <p:sp>
+            <p:nvSpPr>
+              <p:cNvPr id="8" name="Rectangle: Rounded Corners 7">
+                <a:extLst>
+                  <a:ext uri="{FF2B5EF4-FFF2-40B4-BE49-F238E27FC236}">
+                    <a16:creationId xmlns:a16="http://schemas.microsoft.com/office/drawing/2014/main" id="{6FE2E30A-0E31-4FCE-A7B9-2718E0718217}"/>
+                  </a:ext>
+                </a:extLst>
+              </p:cNvPr>
+              <p:cNvSpPr>
+                <a:spLocks noRot="1" noChangeAspect="1" noMove="1" noResize="1" noEditPoints="1" noAdjustHandles="1" noChangeArrowheads="1" noChangeShapeType="1" noTextEdit="1"/>
+              </p:cNvSpPr>
+              <p:nvPr/>
+            </p:nvSpPr>
+            <p:spPr>
+              <a:xfrm>
+                <a:off x="9114183" y="5261252"/>
+                <a:ext cx="2837025" cy="932020"/>
+              </a:xfrm>
+              <a:prstGeom prst="roundRect">
+                <a:avLst/>
+              </a:prstGeom>
+              <a:blipFill>
+                <a:blip r:embed="rId4"/>
+                <a:stretch>
+                  <a:fillRect b="-11613"/>
+                </a:stretch>
+              </a:blipFill>
+            </p:spPr>
+            <p:txBody>
+              <a:bodyPr/>
+              <a:lstStyle/>
+              <a:p>
+                <a:r>
+                  <a:rPr lang="en-IL">
+                    <a:noFill/>
+                  </a:rPr>
+                  <a:t> </a:t>
+                </a:r>
+              </a:p>
+            </p:txBody>
+          </p:sp>
+        </mc:Fallback>
+      </mc:AlternateContent>
+      <p:pic>
+        <p:nvPicPr>
+          <p:cNvPr id="9" name="Picture 8">
+            <a:hlinkClick r:id="rId5"/>
+            <a:extLst>
+              <a:ext uri="{FF2B5EF4-FFF2-40B4-BE49-F238E27FC236}">
+                <a16:creationId xmlns:a16="http://schemas.microsoft.com/office/drawing/2014/main" id="{2BCCE999-1D4B-4A8E-8659-BB9428D7D96E}"/>
+              </a:ext>
+            </a:extLst>
+          </p:cNvPr>
+          <p:cNvPicPr>
+            <a:picLocks noChangeAspect="1"/>
+          </p:cNvPicPr>
+          <p:nvPr/>
+        </p:nvPicPr>
+        <p:blipFill>
+          <a:blip r:embed="rId6"/>
+          <a:stretch>
+            <a:fillRect/>
+          </a:stretch>
+        </p:blipFill>
+        <p:spPr>
+          <a:xfrm>
+            <a:off x="160937" y="5318647"/>
+            <a:ext cx="1067424" cy="903845"/>
+          </a:xfrm>
+          <a:prstGeom prst="rect">
+            <a:avLst/>
+          </a:prstGeom>
+        </p:spPr>
+      </p:pic>
+    </p:spTree>
+    <p:extLst>
+      <p:ext uri="{BB962C8B-B14F-4D97-AF65-F5344CB8AC3E}">
+        <p14:creationId xmlns:p14="http://schemas.microsoft.com/office/powerpoint/2010/main" val="2352103194"/>
+      </p:ext>
+    </p:extLst>
+  </p:cSld>
+  <p:clrMapOvr>
+    <a:masterClrMapping/>
+  </p:clrMapOvr>
+  <p:timing>
+    <p:tnLst>
+      <p:par>
+        <p:cTn id="1" dur="indefinite" restart="never" nodeType="tmRoot">
+          <p:childTnLst>
+            <p:seq concurrent="1" nextAc="seek">
+              <p:cTn id="2" dur="indefinite" nodeType="mainSeq">
+                <p:childTnLst>
+                  <p:par>
+                    <p:cTn id="3" fill="hold">
+                      <p:stCondLst>
+                        <p:cond delay="indefinite"/>
+                      </p:stCondLst>
+                      <p:childTnLst>
+                        <p:par>
+                          <p:cTn id="4" fill="hold">
+                            <p:stCondLst>
+                              <p:cond delay="0"/>
+                            </p:stCondLst>
+                            <p:childTnLst>
+                              <p:par>
+                                <p:cTn id="5" presetID="1" presetClass="entr" presetSubtype="0" fill="hold" nodeType="clickEffect">
+                                  <p:stCondLst>
+                                    <p:cond delay="0"/>
+                                  </p:stCondLst>
+                                  <p:childTnLst>
+                                    <p:set>
+                                      <p:cBhvr>
+                                        <p:cTn id="6" dur="1" fill="hold">
+                                          <p:stCondLst>
+                                            <p:cond delay="0"/>
+                                          </p:stCondLst>
+                                        </p:cTn>
+                                        <p:tgtEl>
+                                          <p:spTgt spid="3">
+                                            <p:txEl>
+                                              <p:pRg st="0" end="0"/>
+                                            </p:txEl>
+                                          </p:spTgt>
+                                        </p:tgtEl>
+                                        <p:attrNameLst>
+                                          <p:attrName>style.visibility</p:attrName>
+                                        </p:attrNameLst>
+                                      </p:cBhvr>
+                                      <p:to>
+                                        <p:strVal val="visible"/>
+                                      </p:to>
+                                    </p:set>
+                                  </p:childTnLst>
+                                </p:cTn>
+                              </p:par>
+                              <p:par>
+                                <p:cTn id="7" presetID="1" presetClass="entr" presetSubtype="0" fill="hold" nodeType="withEffect">
+                                  <p:stCondLst>
+                                    <p:cond delay="0"/>
+                                  </p:stCondLst>
+                                  <p:childTnLst>
+                                    <p:set>
+                                      <p:cBhvr>
+                                        <p:cTn id="8" dur="1" fill="hold">
+                                          <p:stCondLst>
+                                            <p:cond delay="0"/>
+                                          </p:stCondLst>
+                                        </p:cTn>
+                                        <p:tgtEl>
+                                          <p:spTgt spid="3">
+                                            <p:txEl>
+                                              <p:pRg st="1" end="1"/>
+                                            </p:txEl>
+                                          </p:spTgt>
+                                        </p:tgtEl>
+                                        <p:attrNameLst>
+                                          <p:attrName>style.visibility</p:attrName>
+                                        </p:attrNameLst>
+                                      </p:cBhvr>
+                                      <p:to>
+                                        <p:strVal val="visible"/>
+                                      </p:to>
+                                    </p:set>
+                                  </p:childTnLst>
+                                </p:cTn>
+                              </p:par>
+                            </p:childTnLst>
+                          </p:cTn>
+                        </p:par>
+                      </p:childTnLst>
+                    </p:cTn>
+                  </p:par>
+                  <p:par>
+                    <p:cTn id="9" fill="hold">
+                      <p:stCondLst>
+                        <p:cond delay="indefinite"/>
+                      </p:stCondLst>
+                      <p:childTnLst>
+                        <p:par>
+                          <p:cTn id="10" fill="hold">
+                            <p:stCondLst>
+                              <p:cond delay="0"/>
+                            </p:stCondLst>
+                            <p:childTnLst>
+                              <p:par>
+                                <p:cTn id="11" presetID="1" presetClass="entr" presetSubtype="0" fill="hold" nodeType="clickEffect">
+                                  <p:stCondLst>
+                                    <p:cond delay="0"/>
+                                  </p:stCondLst>
+                                  <p:childTnLst>
+                                    <p:set>
+                                      <p:cBhvr>
+                                        <p:cTn id="12" dur="1" fill="hold">
+                                          <p:stCondLst>
+                                            <p:cond delay="0"/>
+                                          </p:stCondLst>
+                                        </p:cTn>
+                                        <p:tgtEl>
+                                          <p:spTgt spid="3">
+                                            <p:txEl>
+                                              <p:pRg st="2" end="2"/>
+                                            </p:txEl>
+                                          </p:spTgt>
+                                        </p:tgtEl>
+                                        <p:attrNameLst>
+                                          <p:attrName>style.visibility</p:attrName>
+                                        </p:attrNameLst>
+                                      </p:cBhvr>
+                                      <p:to>
+                                        <p:strVal val="visible"/>
+                                      </p:to>
+                                    </p:set>
+                                  </p:childTnLst>
+                                </p:cTn>
+                              </p:par>
+                              <p:par>
+                                <p:cTn id="13" presetID="1" presetClass="entr" presetSubtype="0" fill="hold" nodeType="withEffect">
+                                  <p:stCondLst>
+                                    <p:cond delay="0"/>
+                                  </p:stCondLst>
+                                  <p:childTnLst>
+                                    <p:set>
+                                      <p:cBhvr>
+                                        <p:cTn id="14" dur="1" fill="hold">
+                                          <p:stCondLst>
+                                            <p:cond delay="0"/>
+                                          </p:stCondLst>
+                                        </p:cTn>
+                                        <p:tgtEl>
+                                          <p:spTgt spid="3">
+                                            <p:txEl>
+                                              <p:pRg st="3" end="3"/>
+                                            </p:txEl>
+                                          </p:spTgt>
+                                        </p:tgtEl>
+                                        <p:attrNameLst>
+                                          <p:attrName>style.visibility</p:attrName>
+                                        </p:attrNameLst>
+                                      </p:cBhvr>
+                                      <p:to>
+                                        <p:strVal val="visible"/>
+                                      </p:to>
+                                    </p:set>
+                                  </p:childTnLst>
+                                </p:cTn>
+                              </p:par>
+                              <p:par>
+                                <p:cTn id="15" presetID="1" presetClass="entr" presetSubtype="0" fill="hold" nodeType="withEffect">
+                                  <p:stCondLst>
+                                    <p:cond delay="0"/>
+                                  </p:stCondLst>
+                                  <p:childTnLst>
+                                    <p:set>
+                                      <p:cBhvr>
+                                        <p:cTn id="16" dur="1" fill="hold">
+                                          <p:stCondLst>
+                                            <p:cond delay="0"/>
+                                          </p:stCondLst>
+                                        </p:cTn>
+                                        <p:tgtEl>
+                                          <p:spTgt spid="3">
+                                            <p:txEl>
+                                              <p:pRg st="4" end="4"/>
+                                            </p:txEl>
+                                          </p:spTgt>
+                                        </p:tgtEl>
+                                        <p:attrNameLst>
+                                          <p:attrName>style.visibility</p:attrName>
+                                        </p:attrNameLst>
+                                      </p:cBhvr>
+                                      <p:to>
+                                        <p:strVal val="visible"/>
+                                      </p:to>
+                                    </p:set>
+                                  </p:childTnLst>
+                                </p:cTn>
+                              </p:par>
+                              <p:par>
+                                <p:cTn id="17" presetID="1" presetClass="entr" presetSubtype="0" fill="hold" grpId="0" nodeType="withEffect">
+                                  <p:stCondLst>
+                                    <p:cond delay="0"/>
+                                  </p:stCondLst>
+                                  <p:childTnLst>
+                                    <p:set>
+                                      <p:cBhvr>
+                                        <p:cTn id="18" dur="1" fill="hold">
+                                          <p:stCondLst>
+                                            <p:cond delay="0"/>
+                                          </p:stCondLst>
+                                        </p:cTn>
+                                        <p:tgtEl>
+                                          <p:spTgt spid="6"/>
+                                        </p:tgtEl>
+                                        <p:attrNameLst>
+                                          <p:attrName>style.visibility</p:attrName>
+                                        </p:attrNameLst>
+                                      </p:cBhvr>
+                                      <p:to>
+                                        <p:strVal val="visible"/>
+                                      </p:to>
+                                    </p:set>
+                                  </p:childTnLst>
+                                </p:cTn>
+                              </p:par>
+                            </p:childTnLst>
+                          </p:cTn>
+                        </p:par>
+                      </p:childTnLst>
+                    </p:cTn>
+                  </p:par>
+                  <p:par>
+                    <p:cTn id="19" fill="hold">
+                      <p:stCondLst>
+                        <p:cond delay="indefinite"/>
+                      </p:stCondLst>
+                      <p:childTnLst>
+                        <p:par>
+                          <p:cTn id="20" fill="hold">
+                            <p:stCondLst>
+                              <p:cond delay="0"/>
+                            </p:stCondLst>
+                            <p:childTnLst>
+                              <p:par>
+                                <p:cTn id="21" presetID="1" presetClass="entr" presetSubtype="0" fill="hold" nodeType="clickEffect">
+                                  <p:stCondLst>
+                                    <p:cond delay="0"/>
+                                  </p:stCondLst>
+                                  <p:childTnLst>
+                                    <p:set>
+                                      <p:cBhvr>
+                                        <p:cTn id="22" dur="1" fill="hold">
+                                          <p:stCondLst>
+                                            <p:cond delay="0"/>
+                                          </p:stCondLst>
+                                        </p:cTn>
+                                        <p:tgtEl>
+                                          <p:spTgt spid="3">
+                                            <p:txEl>
+                                              <p:pRg st="5" end="5"/>
+                                            </p:txEl>
+                                          </p:spTgt>
+                                        </p:tgtEl>
+                                        <p:attrNameLst>
+                                          <p:attrName>style.visibility</p:attrName>
+                                        </p:attrNameLst>
+                                      </p:cBhvr>
+                                      <p:to>
+                                        <p:strVal val="visible"/>
+                                      </p:to>
+                                    </p:set>
+                                  </p:childTnLst>
+                                </p:cTn>
+                              </p:par>
+                              <p:par>
+                                <p:cTn id="23" presetID="1" presetClass="entr" presetSubtype="0" fill="hold" nodeType="withEffect">
+                                  <p:stCondLst>
+                                    <p:cond delay="0"/>
+                                  </p:stCondLst>
+                                  <p:childTnLst>
+                                    <p:set>
+                                      <p:cBhvr>
+                                        <p:cTn id="24" dur="1" fill="hold">
+                                          <p:stCondLst>
+                                            <p:cond delay="0"/>
+                                          </p:stCondLst>
+                                        </p:cTn>
+                                        <p:tgtEl>
+                                          <p:spTgt spid="3">
+                                            <p:txEl>
+                                              <p:pRg st="6" end="6"/>
+                                            </p:txEl>
+                                          </p:spTgt>
+                                        </p:tgtEl>
+                                        <p:attrNameLst>
+                                          <p:attrName>style.visibility</p:attrName>
+                                        </p:attrNameLst>
+                                      </p:cBhvr>
+                                      <p:to>
+                                        <p:strVal val="visible"/>
+                                      </p:to>
+                                    </p:set>
+                                  </p:childTnLst>
+                                </p:cTn>
+                              </p:par>
+                              <p:par>
+                                <p:cTn id="25" presetID="1" presetClass="entr" presetSubtype="0" fill="hold" grpId="0" nodeType="withEffect">
+                                  <p:stCondLst>
+                                    <p:cond delay="0"/>
+                                  </p:stCondLst>
+                                  <p:childTnLst>
+                                    <p:set>
+                                      <p:cBhvr>
+                                        <p:cTn id="26" dur="1" fill="hold">
+                                          <p:stCondLst>
+                                            <p:cond delay="0"/>
+                                          </p:stCondLst>
+                                        </p:cTn>
+                                        <p:tgtEl>
+                                          <p:spTgt spid="7"/>
+                                        </p:tgtEl>
+                                        <p:attrNameLst>
+                                          <p:attrName>style.visibility</p:attrName>
+                                        </p:attrNameLst>
+                                      </p:cBhvr>
+                                      <p:to>
+                                        <p:strVal val="visible"/>
+                                      </p:to>
+                                    </p:set>
+                                  </p:childTnLst>
+                                </p:cTn>
+                              </p:par>
+                            </p:childTnLst>
+                          </p:cTn>
+                        </p:par>
+                      </p:childTnLst>
+                    </p:cTn>
+                  </p:par>
+                  <p:par>
+                    <p:cTn id="27" fill="hold">
+                      <p:stCondLst>
+                        <p:cond delay="indefinite"/>
+                      </p:stCondLst>
+                      <p:childTnLst>
+                        <p:par>
+                          <p:cTn id="28" fill="hold">
+                            <p:stCondLst>
+                              <p:cond delay="0"/>
+                            </p:stCondLst>
+                            <p:childTnLst>
+                              <p:par>
+                                <p:cTn id="29" presetID="1" presetClass="entr" presetSubtype="0" fill="hold" nodeType="clickEffect">
+                                  <p:stCondLst>
+                                    <p:cond delay="0"/>
+                                  </p:stCondLst>
+                                  <p:childTnLst>
+                                    <p:set>
+                                      <p:cBhvr>
+                                        <p:cTn id="30" dur="1" fill="hold">
+                                          <p:stCondLst>
+                                            <p:cond delay="0"/>
+                                          </p:stCondLst>
+                                        </p:cTn>
+                                        <p:tgtEl>
+                                          <p:spTgt spid="3">
+                                            <p:txEl>
+                                              <p:pRg st="7" end="7"/>
+                                            </p:txEl>
+                                          </p:spTgt>
+                                        </p:tgtEl>
+                                        <p:attrNameLst>
+                                          <p:attrName>style.visibility</p:attrName>
+                                        </p:attrNameLst>
+                                      </p:cBhvr>
+                                      <p:to>
+                                        <p:strVal val="visible"/>
+                                      </p:to>
+                                    </p:set>
+                                  </p:childTnLst>
+                                </p:cTn>
+                              </p:par>
+                              <p:par>
+                                <p:cTn id="31" presetID="1" presetClass="entr" presetSubtype="0" fill="hold" nodeType="withEffect">
+                                  <p:stCondLst>
+                                    <p:cond delay="0"/>
+                                  </p:stCondLst>
+                                  <p:childTnLst>
+                                    <p:set>
+                                      <p:cBhvr>
+                                        <p:cTn id="32" dur="1" fill="hold">
+                                          <p:stCondLst>
+                                            <p:cond delay="0"/>
+                                          </p:stCondLst>
+                                        </p:cTn>
+                                        <p:tgtEl>
+                                          <p:spTgt spid="3">
+                                            <p:txEl>
+                                              <p:pRg st="8" end="8"/>
+                                            </p:txEl>
+                                          </p:spTgt>
+                                        </p:tgtEl>
+                                        <p:attrNameLst>
+                                          <p:attrName>style.visibility</p:attrName>
+                                        </p:attrNameLst>
+                                      </p:cBhvr>
+                                      <p:to>
+                                        <p:strVal val="visible"/>
+                                      </p:to>
+                                    </p:set>
+                                  </p:childTnLst>
+                                </p:cTn>
+                              </p:par>
+                              <p:par>
+                                <p:cTn id="33" presetID="1" presetClass="entr" presetSubtype="0" fill="hold" grpId="0" nodeType="withEffect">
+                                  <p:stCondLst>
+                                    <p:cond delay="0"/>
+                                  </p:stCondLst>
+                                  <p:childTnLst>
+                                    <p:set>
+                                      <p:cBhvr>
+                                        <p:cTn id="34" dur="1" fill="hold">
+                                          <p:stCondLst>
+                                            <p:cond delay="0"/>
+                                          </p:stCondLst>
+                                        </p:cTn>
+                                        <p:tgtEl>
+                                          <p:spTgt spid="8"/>
+                                        </p:tgtEl>
+                                        <p:attrNameLst>
+                                          <p:attrName>style.visibility</p:attrName>
+                                        </p:attrNameLst>
+                                      </p:cBhvr>
+                                      <p:to>
+                                        <p:strVal val="visible"/>
+                                      </p:to>
+                                    </p:set>
+                                  </p:childTnLst>
+                                </p:cTn>
+                              </p:par>
+                            </p:childTnLst>
+                          </p:cTn>
+                        </p:par>
+                      </p:childTnLst>
+                    </p:cTn>
+                  </p:par>
+                  <p:par>
+                    <p:cTn id="35" fill="hold">
+                      <p:stCondLst>
+                        <p:cond delay="indefinite"/>
+                      </p:stCondLst>
+                      <p:childTnLst>
+                        <p:par>
+                          <p:cTn id="36" fill="hold">
+                            <p:stCondLst>
+                              <p:cond delay="0"/>
+                            </p:stCondLst>
+                            <p:childTnLst>
+                              <p:par>
+                                <p:cTn id="37" presetID="1" presetClass="entr" presetSubtype="0" fill="hold" nodeType="clickEffect">
+                                  <p:stCondLst>
+                                    <p:cond delay="0"/>
+                                  </p:stCondLst>
+                                  <p:childTnLst>
+                                    <p:set>
+                                      <p:cBhvr>
+                                        <p:cTn id="38" dur="1" fill="hold">
+                                          <p:stCondLst>
+                                            <p:cond delay="0"/>
+                                          </p:stCondLst>
+                                        </p:cTn>
+                                        <p:tgtEl>
+                                          <p:spTgt spid="9"/>
+                                        </p:tgtEl>
+                                        <p:attrNameLst>
+                                          <p:attrName>style.visibility</p:attrName>
+                                        </p:attrNameLst>
+                                      </p:cBhvr>
+                                      <p:to>
+                                        <p:strVal val="visible"/>
+                                      </p:to>
+                                    </p:set>
+                                  </p:childTnLst>
+                                </p:cTn>
+                              </p:par>
+                            </p:childTnLst>
+                          </p:cTn>
+                        </p:par>
+                      </p:childTnLst>
+                    </p:cTn>
+                  </p:par>
+                </p:childTnLst>
+              </p:cTn>
+              <p:prevCondLst>
+                <p:cond evt="onPrev" delay="0">
+                  <p:tgtEl>
+                    <p:sldTgt/>
+                  </p:tgtEl>
+                </p:cond>
+              </p:prevCondLst>
+              <p:nextCondLst>
+                <p:cond evt="onNext" delay="0">
+                  <p:tgtEl>
+                    <p:sldTgt/>
+                  </p:tgtEl>
+                </p:cond>
+              </p:nextCondLst>
+            </p:seq>
+          </p:childTnLst>
+        </p:cTn>
+      </p:par>
+    </p:tnLst>
+    <p:bldLst>
+      <p:bldP spid="6" grpId="0" animBg="1"/>
+      <p:bldP spid="7" grpId="0" animBg="1"/>
+      <p:bldP spid="8" grpId="0" animBg="1"/>
+    </p:bldLst>
+  </p:timing>
+</p:sld>
+</file>
+
+<file path=ppt/slides/slide35.xml><?xml version="1.0" encoding="utf-8"?>
+<p:sld xmlns:a="http://schemas.openxmlformats.org/drawingml/2006/main" xmlns:r="http://schemas.openxmlformats.org/officeDocument/2006/relationships" xmlns:p="http://schemas.openxmlformats.org/presentationml/2006/main">
+  <p:cSld>
+    <p:spTree>
+      <p:nvGrpSpPr>
+        <p:cNvPr id="1" name=""/>
+        <p:cNvGrpSpPr/>
+        <p:nvPr/>
+      </p:nvGrpSpPr>
+      <p:grpSpPr>
+        <a:xfrm>
+          <a:off x="0" y="0"/>
+          <a:ext cx="0" cy="0"/>
+          <a:chOff x="0" y="0"/>
+          <a:chExt cx="0" cy="0"/>
+        </a:xfrm>
+      </p:grpSpPr>
+      <p:sp>
+        <p:nvSpPr>
+          <p:cNvPr id="2" name="Title 1">
+            <a:extLst>
+              <a:ext uri="{FF2B5EF4-FFF2-40B4-BE49-F238E27FC236}">
+                <a16:creationId xmlns:a16="http://schemas.microsoft.com/office/drawing/2014/main" id="{07D8F375-DDF5-41C0-BB2D-907F6A5D69B3}"/>
+              </a:ext>
+            </a:extLst>
+          </p:cNvPr>
+          <p:cNvSpPr>
+            <a:spLocks noGrp="1"/>
+          </p:cNvSpPr>
+          <p:nvPr>
+            <p:ph type="title"/>
+          </p:nvPr>
+        </p:nvSpPr>
+        <p:spPr/>
+        <p:txBody>
+          <a:bodyPr/>
+          <a:lstStyle/>
+          <a:p>
+            <a:r>
+              <a:rPr lang="en-US" dirty="0"/>
+              <a:t>Example for LOF</a:t>
+            </a:r>
+            <a:endParaRPr lang="en-IL" dirty="0"/>
+          </a:p>
+        </p:txBody>
+      </p:sp>
+      <p:sp>
+        <p:nvSpPr>
+          <p:cNvPr id="3" name="Content Placeholder 2">
+            <a:extLst>
+              <a:ext uri="{FF2B5EF4-FFF2-40B4-BE49-F238E27FC236}">
+                <a16:creationId xmlns:a16="http://schemas.microsoft.com/office/drawing/2014/main" id="{02724287-A470-4E33-9318-87682D048AEF}"/>
+              </a:ext>
+            </a:extLst>
+          </p:cNvPr>
+          <p:cNvSpPr>
+            <a:spLocks noGrp="1"/>
+          </p:cNvSpPr>
+          <p:nvPr>
+            <p:ph idx="1"/>
+          </p:nvPr>
+        </p:nvSpPr>
+        <p:spPr/>
+        <p:txBody>
+          <a:bodyPr/>
+          <a:lstStyle/>
+          <a:p>
+            <a:r>
+              <a:rPr lang="en-US" dirty="0"/>
+              <a:t>/class code/05-outlier_detection.R</a:t>
+            </a:r>
+            <a:endParaRPr lang="en-IL" dirty="0"/>
+          </a:p>
+        </p:txBody>
+      </p:sp>
+      <p:sp>
+        <p:nvSpPr>
+          <p:cNvPr id="4" name="Footer Placeholder 3">
+            <a:extLst>
+              <a:ext uri="{FF2B5EF4-FFF2-40B4-BE49-F238E27FC236}">
+                <a16:creationId xmlns:a16="http://schemas.microsoft.com/office/drawing/2014/main" id="{45609660-195C-4F0A-B0BB-3BBE2D9FBEB5}"/>
+              </a:ext>
+            </a:extLst>
+          </p:cNvPr>
+          <p:cNvSpPr>
+            <a:spLocks noGrp="1"/>
+          </p:cNvSpPr>
+          <p:nvPr>
+            <p:ph type="ftr" sz="quarter" idx="11"/>
+          </p:nvPr>
+        </p:nvSpPr>
+        <p:spPr/>
+        <p:txBody>
+          <a:bodyPr/>
+          <a:lstStyle/>
+          <a:p>
+            <a:r>
+              <a:rPr lang="en-US"/>
+              <a:t>Materials by Adi Sarid https://adisarid.github.io and http://www.sarid-ins.com</a:t>
+            </a:r>
+            <a:endParaRPr lang="en-US" dirty="0"/>
+          </a:p>
+        </p:txBody>
+      </p:sp>
+      <p:sp>
+        <p:nvSpPr>
+          <p:cNvPr id="5" name="Slide Number Placeholder 4">
+            <a:extLst>
+              <a:ext uri="{FF2B5EF4-FFF2-40B4-BE49-F238E27FC236}">
+                <a16:creationId xmlns:a16="http://schemas.microsoft.com/office/drawing/2014/main" id="{6B053A59-F636-441E-8BC2-FE341669A40D}"/>
+              </a:ext>
+            </a:extLst>
+          </p:cNvPr>
+          <p:cNvSpPr>
+            <a:spLocks noGrp="1"/>
+          </p:cNvSpPr>
+          <p:nvPr>
+            <p:ph type="sldNum" sz="quarter" idx="12"/>
+          </p:nvPr>
+        </p:nvSpPr>
+        <p:spPr/>
+        <p:txBody>
+          <a:bodyPr/>
+          <a:lstStyle/>
+          <a:p>
+            <a:fld id="{4FAB73BC-B049-4115-A692-8D63A059BFB8}" type="slidenum">
+              <a:rPr lang="en-US" smtClean="0"/>
+              <a:t>35</a:t>
+            </a:fld>
+            <a:endParaRPr lang="en-US" dirty="0"/>
+          </a:p>
+        </p:txBody>
+      </p:sp>
+    </p:spTree>
+    <p:extLst>
+      <p:ext uri="{BB962C8B-B14F-4D97-AF65-F5344CB8AC3E}">
+        <p14:creationId xmlns:p14="http://schemas.microsoft.com/office/powerpoint/2010/main" val="585724445"/>
+      </p:ext>
+    </p:extLst>
+  </p:cSld>
+  <p:clrMapOvr>
+    <a:masterClrMapping/>
+  </p:clrMapOvr>
+</p:sld>
+</file>
+
+<file path=ppt/slides/slide36.xml><?xml version="1.0" encoding="utf-8"?>
+<p:sld xmlns:a="http://schemas.openxmlformats.org/drawingml/2006/main" xmlns:r="http://schemas.openxmlformats.org/officeDocument/2006/relationships" xmlns:p="http://schemas.openxmlformats.org/presentationml/2006/main" show="0">
+  <p:cSld>
+    <p:spTree>
+      <p:nvGrpSpPr>
+        <p:cNvPr id="1" name=""/>
+        <p:cNvGrpSpPr/>
+        <p:nvPr/>
+      </p:nvGrpSpPr>
+      <p:grpSpPr>
+        <a:xfrm>
+          <a:off x="0" y="0"/>
+          <a:ext cx="0" cy="0"/>
+          <a:chOff x="0" y="0"/>
+          <a:chExt cx="0" cy="0"/>
+        </a:xfrm>
+      </p:grpSpPr>
+      <p:sp>
+        <p:nvSpPr>
+          <p:cNvPr id="2" name="Title 1">
+            <a:extLst>
+              <a:ext uri="{FF2B5EF4-FFF2-40B4-BE49-F238E27FC236}">
+                <a16:creationId xmlns:a16="http://schemas.microsoft.com/office/drawing/2014/main" id="{59BC750E-3707-4D46-A15F-2F180DCBDA8B}"/>
+              </a:ext>
+            </a:extLst>
+          </p:cNvPr>
+          <p:cNvSpPr>
+            <a:spLocks noGrp="1"/>
+          </p:cNvSpPr>
+          <p:nvPr>
+            <p:ph type="title"/>
+          </p:nvPr>
+        </p:nvSpPr>
+        <p:spPr/>
+        <p:txBody>
+          <a:bodyPr/>
+          <a:lstStyle/>
+          <a:p>
+            <a:r>
+              <a:rPr lang="en-US" dirty="0"/>
+              <a:t>Isolation Forests</a:t>
+            </a:r>
+            <a:endParaRPr lang="en-IL" dirty="0"/>
+          </a:p>
+        </p:txBody>
+      </p:sp>
+      <mc:AlternateContent xmlns:mc="http://schemas.openxmlformats.org/markup-compatibility/2006">
+        <mc:Choice xmlns:a14="http://schemas.microsoft.com/office/drawing/2010/main" Requires="a14">
+          <p:sp>
+            <p:nvSpPr>
+              <p:cNvPr id="3" name="Content Placeholder 2">
+                <a:extLst>
+                  <a:ext uri="{FF2B5EF4-FFF2-40B4-BE49-F238E27FC236}">
+                    <a16:creationId xmlns:a16="http://schemas.microsoft.com/office/drawing/2014/main" id="{B924E435-F21C-44DC-93B5-94285DE754F8}"/>
+                  </a:ext>
+                </a:extLst>
+              </p:cNvPr>
+              <p:cNvSpPr>
+                <a:spLocks noGrp="1"/>
+              </p:cNvSpPr>
+              <p:nvPr>
+                <p:ph idx="1"/>
+              </p:nvPr>
+            </p:nvSpPr>
+            <p:spPr/>
+            <p:txBody>
+              <a:bodyPr>
+                <a:normAutofit/>
+              </a:bodyPr>
+              <a:lstStyle/>
+              <a:p>
+                <a:r>
+                  <a:rPr lang="en-US" dirty="0"/>
+                  <a:t>The basic idea behind isolation forests is to generate “isolation trees”:</a:t>
+                </a:r>
+              </a:p>
+              <a:p>
+                <a:pPr lvl="1"/>
+                <a:r>
+                  <a:rPr lang="en-US" dirty="0"/>
+                  <a:t>Recursively partition a subsample until all observations of the subsample are isolated.</a:t>
+                </a:r>
+              </a:p>
+              <a:p>
+                <a:pPr lvl="1"/>
+                <a:r>
+                  <a:rPr lang="en-US" dirty="0"/>
+                  <a:t>The partitioning is performed randomly (randomly choose a feature, then randomly choose a splitting point in the range of that feature).</a:t>
+                </a:r>
+              </a:p>
+              <a:p>
+                <a:pPr lvl="1"/>
+                <a:r>
+                  <a:rPr lang="en-US" dirty="0"/>
+                  <a:t>Observations which are outliers will have a “short path” in the tree</a:t>
+                </a:r>
+              </a:p>
+              <a:p>
+                <a:pPr lvl="1"/>
+                <a:r>
+                  <a:rPr lang="en-US" dirty="0"/>
+                  <a:t>Observations which are not outlier will have a long path in the tree</a:t>
+                </a:r>
+              </a:p>
+              <a:p>
+                <a:r>
+                  <a:rPr lang="en-US" dirty="0"/>
+                  <a:t>Build many such trees (random sample + random tree building process)</a:t>
+                </a:r>
+              </a:p>
+              <a:p>
+                <a:r>
+                  <a:rPr lang="en-US" dirty="0"/>
+                  <a:t>For every observation, compute its “average path length” </a:t>
+                </a:r>
+                <a14:m>
+                  <m:oMath xmlns:m="http://schemas.openxmlformats.org/officeDocument/2006/math">
+                    <m:r>
+                      <a:rPr lang="en-US" b="0" i="1" smtClean="0">
+                        <a:latin typeface="Cambria Math" panose="02040503050406030204" pitchFamily="18" charset="0"/>
+                      </a:rPr>
+                      <m:t>h</m:t>
+                    </m:r>
+                    <m:d>
+                      <m:dPr>
+                        <m:ctrlPr>
+                          <a:rPr lang="en-US" b="0" i="1" smtClean="0">
+                            <a:latin typeface="Cambria Math" panose="02040503050406030204" pitchFamily="18" charset="0"/>
+                          </a:rPr>
+                        </m:ctrlPr>
+                      </m:dPr>
+                      <m:e>
+                        <m:r>
+                          <a:rPr lang="en-US" b="0" i="1" smtClean="0">
+                            <a:latin typeface="Cambria Math" panose="02040503050406030204" pitchFamily="18" charset="0"/>
+                          </a:rPr>
+                          <m:t>𝑥</m:t>
+                        </m:r>
+                      </m:e>
+                    </m:d>
+                  </m:oMath>
+                </a14:m>
+                <a:r>
+                  <a:rPr lang="en-US" dirty="0"/>
+                  <a:t> (traversing along the tree)</a:t>
+                </a:r>
+              </a:p>
+              <a:p>
+                <a:r>
+                  <a:rPr lang="en-US" dirty="0"/>
+                  <a:t>The anomaly score is computed by taking </a:t>
+                </a:r>
+                <a14:m>
+                  <m:oMath xmlns:m="http://schemas.openxmlformats.org/officeDocument/2006/math">
+                    <m:sSup>
+                      <m:sSupPr>
+                        <m:ctrlPr>
+                          <a:rPr lang="en-US" b="0" i="1" smtClean="0">
+                            <a:latin typeface="Cambria Math" panose="02040503050406030204" pitchFamily="18" charset="0"/>
+                          </a:rPr>
+                        </m:ctrlPr>
+                      </m:sSupPr>
+                      <m:e>
+                        <m:r>
+                          <a:rPr lang="en-US" b="0" i="1" smtClean="0">
+                            <a:latin typeface="Cambria Math" panose="02040503050406030204" pitchFamily="18" charset="0"/>
+                          </a:rPr>
+                          <m:t>2</m:t>
+                        </m:r>
+                      </m:e>
+                      <m:sup>
+                        <m:r>
+                          <a:rPr lang="en-US" b="0" i="1" smtClean="0">
+                            <a:latin typeface="Cambria Math" panose="02040503050406030204" pitchFamily="18" charset="0"/>
+                          </a:rPr>
+                          <m:t>−</m:t>
+                        </m:r>
+                        <m:r>
+                          <a:rPr lang="en-US" b="0" i="1" smtClean="0">
+                            <a:latin typeface="Cambria Math" panose="02040503050406030204" pitchFamily="18" charset="0"/>
+                          </a:rPr>
+                          <m:t>𝐸</m:t>
+                        </m:r>
+                        <m:d>
+                          <m:dPr>
+                            <m:begChr m:val="["/>
+                            <m:endChr m:val="]"/>
+                            <m:ctrlPr>
+                              <a:rPr lang="en-US" b="0" i="1" smtClean="0">
+                                <a:latin typeface="Cambria Math" panose="02040503050406030204" pitchFamily="18" charset="0"/>
+                              </a:rPr>
+                            </m:ctrlPr>
+                          </m:dPr>
+                          <m:e>
+                            <m:r>
+                              <a:rPr lang="en-US" b="0" i="1" smtClean="0">
+                                <a:latin typeface="Cambria Math" panose="02040503050406030204" pitchFamily="18" charset="0"/>
+                              </a:rPr>
+                              <m:t>h</m:t>
+                            </m:r>
+                            <m:d>
+                              <m:dPr>
+                                <m:ctrlPr>
+                                  <a:rPr lang="en-US" b="0" i="1" smtClean="0">
+                                    <a:latin typeface="Cambria Math" panose="02040503050406030204" pitchFamily="18" charset="0"/>
+                                  </a:rPr>
+                                </m:ctrlPr>
+                              </m:dPr>
+                              <m:e>
+                                <m:r>
+                                  <a:rPr lang="en-US" b="0" i="1" smtClean="0">
+                                    <a:latin typeface="Cambria Math" panose="02040503050406030204" pitchFamily="18" charset="0"/>
+                                  </a:rPr>
+                                  <m:t>𝑥</m:t>
+                                </m:r>
+                              </m:e>
+                            </m:d>
+                          </m:e>
+                        </m:d>
+                        <m:r>
+                          <a:rPr lang="en-US" b="0" i="1" smtClean="0">
+                            <a:latin typeface="Cambria Math" panose="02040503050406030204" pitchFamily="18" charset="0"/>
+                          </a:rPr>
+                          <m:t>/</m:t>
+                        </m:r>
+                        <m:r>
+                          <a:rPr lang="en-US" b="0" i="1" smtClean="0">
+                            <a:latin typeface="Cambria Math" panose="02040503050406030204" pitchFamily="18" charset="0"/>
+                          </a:rPr>
+                          <m:t>𝑐</m:t>
+                        </m:r>
+                        <m:d>
+                          <m:dPr>
+                            <m:ctrlPr>
+                              <a:rPr lang="en-US" b="0" i="1" smtClean="0">
+                                <a:latin typeface="Cambria Math" panose="02040503050406030204" pitchFamily="18" charset="0"/>
+                              </a:rPr>
+                            </m:ctrlPr>
+                          </m:dPr>
+                          <m:e>
+                            <m:r>
+                              <a:rPr lang="en-US" b="0" i="1" smtClean="0">
+                                <a:latin typeface="Cambria Math" panose="02040503050406030204" pitchFamily="18" charset="0"/>
+                              </a:rPr>
+                              <m:t>𝜓</m:t>
+                            </m:r>
+                          </m:e>
+                        </m:d>
+                      </m:sup>
+                    </m:sSup>
+                  </m:oMath>
+                </a14:m>
+                <a:r>
+                  <a:rPr lang="en-US" dirty="0"/>
+                  <a:t> </a:t>
+                </a:r>
+              </a:p>
+            </p:txBody>
+          </p:sp>
+        </mc:Choice>
+        <mc:Fallback>
+          <p:sp>
+            <p:nvSpPr>
+              <p:cNvPr id="3" name="Content Placeholder 2">
+                <a:extLst>
+                  <a:ext uri="{FF2B5EF4-FFF2-40B4-BE49-F238E27FC236}">
+                    <a16:creationId xmlns:a16="http://schemas.microsoft.com/office/drawing/2014/main" id="{B924E435-F21C-44DC-93B5-94285DE754F8}"/>
+                  </a:ext>
+                </a:extLst>
+              </p:cNvPr>
+              <p:cNvSpPr>
+                <a:spLocks noGrp="1" noRot="1" noChangeAspect="1" noMove="1" noResize="1" noEditPoints="1" noAdjustHandles="1" noChangeArrowheads="1" noChangeShapeType="1" noTextEdit="1"/>
+              </p:cNvSpPr>
+              <p:nvPr>
+                <p:ph idx="1"/>
+              </p:nvPr>
+            </p:nvSpPr>
+            <p:spPr>
+              <a:blipFill>
+                <a:blip r:embed="rId3"/>
+                <a:stretch>
+                  <a:fillRect l="-303" t="-752" b="-2406"/>
+                </a:stretch>
+              </a:blipFill>
+            </p:spPr>
+            <p:txBody>
+              <a:bodyPr/>
+              <a:lstStyle/>
+              <a:p>
+                <a:r>
+                  <a:rPr lang="en-IL">
+                    <a:noFill/>
+                  </a:rPr>
+                  <a:t> </a:t>
+                </a:r>
+              </a:p>
+            </p:txBody>
+          </p:sp>
+        </mc:Fallback>
+      </mc:AlternateContent>
+      <p:sp>
+        <p:nvSpPr>
+          <p:cNvPr id="4" name="Footer Placeholder 3">
+            <a:extLst>
+              <a:ext uri="{FF2B5EF4-FFF2-40B4-BE49-F238E27FC236}">
+                <a16:creationId xmlns:a16="http://schemas.microsoft.com/office/drawing/2014/main" id="{AA2A2E24-57D9-49E1-B0E8-30F09775A6A6}"/>
+              </a:ext>
+            </a:extLst>
+          </p:cNvPr>
+          <p:cNvSpPr>
+            <a:spLocks noGrp="1"/>
+          </p:cNvSpPr>
+          <p:nvPr>
+            <p:ph type="ftr" sz="quarter" idx="11"/>
+          </p:nvPr>
+        </p:nvSpPr>
+        <p:spPr/>
+        <p:txBody>
+          <a:bodyPr/>
+          <a:lstStyle/>
+          <a:p>
+            <a:r>
+              <a:rPr lang="en-US"/>
+              <a:t>Materials by Adi Sarid https://adisarid.github.io and http://www.sarid-ins.com</a:t>
+            </a:r>
+            <a:endParaRPr lang="en-US" dirty="0"/>
+          </a:p>
+        </p:txBody>
+      </p:sp>
+      <p:sp>
+        <p:nvSpPr>
+          <p:cNvPr id="5" name="Slide Number Placeholder 4">
+            <a:extLst>
+              <a:ext uri="{FF2B5EF4-FFF2-40B4-BE49-F238E27FC236}">
+                <a16:creationId xmlns:a16="http://schemas.microsoft.com/office/drawing/2014/main" id="{EF94A421-B367-41F7-A3A1-DC9BFA97FCA1}"/>
+              </a:ext>
+            </a:extLst>
+          </p:cNvPr>
+          <p:cNvSpPr>
+            <a:spLocks noGrp="1"/>
+          </p:cNvSpPr>
+          <p:nvPr>
+            <p:ph type="sldNum" sz="quarter" idx="12"/>
+          </p:nvPr>
+        </p:nvSpPr>
+        <p:spPr/>
+        <p:txBody>
+          <a:bodyPr/>
+          <a:lstStyle/>
+          <a:p>
+            <a:fld id="{4FAB73BC-B049-4115-A692-8D63A059BFB8}" type="slidenum">
+              <a:rPr lang="en-US" smtClean="0"/>
+              <a:t>36</a:t>
+            </a:fld>
+            <a:endParaRPr lang="en-US" dirty="0"/>
+          </a:p>
+        </p:txBody>
+      </p:sp>
+    </p:spTree>
+    <p:extLst>
+      <p:ext uri="{BB962C8B-B14F-4D97-AF65-F5344CB8AC3E}">
+        <p14:creationId xmlns:p14="http://schemas.microsoft.com/office/powerpoint/2010/main" val="1347919785"/>
+      </p:ext>
+    </p:extLst>
+  </p:cSld>
+  <p:clrMapOvr>
+    <a:masterClrMapping/>
+  </p:clrMapOvr>
+</p:sld>
+</file>
+
 <file path=ppt/slides/slide4.xml><?xml version="1.0" encoding="utf-8"?>
 <p:sld xmlns:a="http://schemas.openxmlformats.org/drawingml/2006/main" xmlns:r="http://schemas.openxmlformats.org/officeDocument/2006/relationships" xmlns:p="http://schemas.openxmlformats.org/presentationml/2006/main">
   <p:cSld>
@@ -25387,7 +29135,7 @@
         <p:spPr/>
         <p:txBody>
           <a:bodyPr>
-            <a:normAutofit fontScale="85000" lnSpcReduction="20000"/>
+            <a:normAutofit lnSpcReduction="10000"/>
           </a:bodyPr>
           <a:lstStyle/>
           <a:p>
@@ -25505,37 +29253,8 @@
             </a:pPr>
             <a:r>
               <a:rPr lang="en-US" dirty="0"/>
-              <a:t>This is known as a “combinatorial algorithm”, there are also:</a:t>
-            </a:r>
-          </a:p>
-          <a:p>
-            <a:pPr lvl="1">
-              <a:lnSpc>
-                <a:spcPct val="120000"/>
-              </a:lnSpc>
-            </a:pPr>
-            <a:r>
-              <a:rPr lang="en-US" dirty="0"/>
-              <a:t>Mixture modeling</a:t>
-            </a:r>
-          </a:p>
-          <a:p>
-            <a:pPr lvl="1">
-              <a:lnSpc>
-                <a:spcPct val="120000"/>
-              </a:lnSpc>
-            </a:pPr>
-            <a:r>
-              <a:rPr lang="en-US" dirty="0"/>
-              <a:t>Mode seekers</a:t>
-            </a:r>
-          </a:p>
-          <a:p>
-            <a:pPr lvl="1">
-              <a:lnSpc>
-                <a:spcPct val="120000"/>
-              </a:lnSpc>
-            </a:pPr>
+              <a:t>This is known as a “combinatorial algorithm” </a:t>
+            </a:r>
             <a:endParaRPr lang="he-IL" dirty="0"/>
           </a:p>
         </p:txBody>

</xml_diff>